<commit_message>
knn1 cleaner scaffolding and unit tests
</commit_message>
<xml_diff>
--- a/machine_learning_curriculum/2.2 Weighted Majority Algorithm 2/2.2 Weighted Majority.pptx
+++ b/machine_learning_curriculum/2.2 Weighted Majority Algorithm 2/2.2 Weighted Majority.pptx
@@ -58,7 +58,10 @@
       <a:spcAft>
         <a:spcPts val="0"/>
       </a:spcAft>
-      <a:buNone/>
+      <a:buClr>
+        <a:srgbClr val="000000"/>
+      </a:buClr>
+      <a:buFont typeface="Arial"/>
       <a:defRPr b="0" i="0" sz="1400" u="none" cap="none" strike="noStrike">
         <a:solidFill>
           <a:srgbClr val="000000"/>
@@ -79,7 +82,10 @@
       <a:spcAft>
         <a:spcPts val="0"/>
       </a:spcAft>
-      <a:buNone/>
+      <a:buClr>
+        <a:srgbClr val="000000"/>
+      </a:buClr>
+      <a:buFont typeface="Arial"/>
       <a:defRPr b="0" i="0" sz="1400" u="none" cap="none" strike="noStrike">
         <a:solidFill>
           <a:srgbClr val="000000"/>
@@ -100,7 +106,10 @@
       <a:spcAft>
         <a:spcPts val="0"/>
       </a:spcAft>
-      <a:buNone/>
+      <a:buClr>
+        <a:srgbClr val="000000"/>
+      </a:buClr>
+      <a:buFont typeface="Arial"/>
       <a:defRPr b="0" i="0" sz="1400" u="none" cap="none" strike="noStrike">
         <a:solidFill>
           <a:srgbClr val="000000"/>
@@ -121,7 +130,10 @@
       <a:spcAft>
         <a:spcPts val="0"/>
       </a:spcAft>
-      <a:buNone/>
+      <a:buClr>
+        <a:srgbClr val="000000"/>
+      </a:buClr>
+      <a:buFont typeface="Arial"/>
       <a:defRPr b="0" i="0" sz="1400" u="none" cap="none" strike="noStrike">
         <a:solidFill>
           <a:srgbClr val="000000"/>
@@ -142,7 +154,10 @@
       <a:spcAft>
         <a:spcPts val="0"/>
       </a:spcAft>
-      <a:buNone/>
+      <a:buClr>
+        <a:srgbClr val="000000"/>
+      </a:buClr>
+      <a:buFont typeface="Arial"/>
       <a:defRPr b="0" i="0" sz="1400" u="none" cap="none" strike="noStrike">
         <a:solidFill>
           <a:srgbClr val="000000"/>
@@ -163,7 +178,10 @@
       <a:spcAft>
         <a:spcPts val="0"/>
       </a:spcAft>
-      <a:buNone/>
+      <a:buClr>
+        <a:srgbClr val="000000"/>
+      </a:buClr>
+      <a:buFont typeface="Arial"/>
       <a:defRPr b="0" i="0" sz="1400" u="none" cap="none" strike="noStrike">
         <a:solidFill>
           <a:srgbClr val="000000"/>
@@ -184,7 +202,10 @@
       <a:spcAft>
         <a:spcPts val="0"/>
       </a:spcAft>
-      <a:buNone/>
+      <a:buClr>
+        <a:srgbClr val="000000"/>
+      </a:buClr>
+      <a:buFont typeface="Arial"/>
       <a:defRPr b="0" i="0" sz="1400" u="none" cap="none" strike="noStrike">
         <a:solidFill>
           <a:srgbClr val="000000"/>
@@ -205,7 +226,10 @@
       <a:spcAft>
         <a:spcPts val="0"/>
       </a:spcAft>
-      <a:buNone/>
+      <a:buClr>
+        <a:srgbClr val="000000"/>
+      </a:buClr>
+      <a:buFont typeface="Arial"/>
       <a:defRPr b="0" i="0" sz="1400" u="none" cap="none" strike="noStrike">
         <a:solidFill>
           <a:srgbClr val="000000"/>
@@ -226,7 +250,10 @@
       <a:spcAft>
         <a:spcPts val="0"/>
       </a:spcAft>
-      <a:buNone/>
+      <a:buClr>
+        <a:srgbClr val="000000"/>
+      </a:buClr>
+      <a:buFont typeface="Arial"/>
       <a:defRPr b="0" i="0" sz="1400" u="none" cap="none" strike="noStrike">
         <a:solidFill>
           <a:srgbClr val="000000"/>
@@ -297,8 +324,8 @@
             </a:solidFill>
             <a:prstDash val="solid"/>
             <a:round/>
-            <a:headEnd len="med" w="med" type="none"/>
-            <a:tailEnd len="med" w="med" type="none"/>
+            <a:headEnd len="sm" w="sm" type="none"/>
+            <a:tailEnd len="sm" w="sm" type="none"/>
           </a:ln>
         </p:spPr>
       </p:sp>
@@ -432,6 +459,235 @@
     </p:spTree>
   </p:cSld>
   <p:clrMap accent1="accent1" accent2="accent2" accent3="accent3" accent4="accent4" accent5="accent5" accent6="accent6" bg1="lt1" bg2="dk2" tx1="dk1" tx2="lt2" folHlink="folHlink" hlink="hlink"/>
+  <p:notesStyle>
+    <a:defPPr lvl="0" marR="0" rtl="0" algn="l">
+      <a:lnSpc>
+        <a:spcPct val="100000"/>
+      </a:lnSpc>
+      <a:spcBef>
+        <a:spcPts val="0"/>
+      </a:spcBef>
+      <a:spcAft>
+        <a:spcPts val="0"/>
+      </a:spcAft>
+    </a:defPPr>
+    <a:lvl1pPr lvl="0" marR="0" rtl="0" algn="l">
+      <a:lnSpc>
+        <a:spcPct val="100000"/>
+      </a:lnSpc>
+      <a:spcBef>
+        <a:spcPts val="0"/>
+      </a:spcBef>
+      <a:spcAft>
+        <a:spcPts val="0"/>
+      </a:spcAft>
+      <a:buClr>
+        <a:srgbClr val="000000"/>
+      </a:buClr>
+      <a:buFont typeface="Arial"/>
+      <a:defRPr b="0" i="0" sz="1400" u="none" cap="none" strike="noStrike">
+        <a:solidFill>
+          <a:srgbClr val="000000"/>
+        </a:solidFill>
+        <a:latin typeface="Arial"/>
+        <a:ea typeface="Arial"/>
+        <a:cs typeface="Arial"/>
+        <a:sym typeface="Arial"/>
+      </a:defRPr>
+    </a:lvl1pPr>
+    <a:lvl2pPr lvl="1" marR="0" rtl="0" algn="l">
+      <a:lnSpc>
+        <a:spcPct val="100000"/>
+      </a:lnSpc>
+      <a:spcBef>
+        <a:spcPts val="0"/>
+      </a:spcBef>
+      <a:spcAft>
+        <a:spcPts val="0"/>
+      </a:spcAft>
+      <a:buClr>
+        <a:srgbClr val="000000"/>
+      </a:buClr>
+      <a:buFont typeface="Arial"/>
+      <a:defRPr b="0" i="0" sz="1400" u="none" cap="none" strike="noStrike">
+        <a:solidFill>
+          <a:srgbClr val="000000"/>
+        </a:solidFill>
+        <a:latin typeface="Arial"/>
+        <a:ea typeface="Arial"/>
+        <a:cs typeface="Arial"/>
+        <a:sym typeface="Arial"/>
+      </a:defRPr>
+    </a:lvl2pPr>
+    <a:lvl3pPr lvl="2" marR="0" rtl="0" algn="l">
+      <a:lnSpc>
+        <a:spcPct val="100000"/>
+      </a:lnSpc>
+      <a:spcBef>
+        <a:spcPts val="0"/>
+      </a:spcBef>
+      <a:spcAft>
+        <a:spcPts val="0"/>
+      </a:spcAft>
+      <a:buClr>
+        <a:srgbClr val="000000"/>
+      </a:buClr>
+      <a:buFont typeface="Arial"/>
+      <a:defRPr b="0" i="0" sz="1400" u="none" cap="none" strike="noStrike">
+        <a:solidFill>
+          <a:srgbClr val="000000"/>
+        </a:solidFill>
+        <a:latin typeface="Arial"/>
+        <a:ea typeface="Arial"/>
+        <a:cs typeface="Arial"/>
+        <a:sym typeface="Arial"/>
+      </a:defRPr>
+    </a:lvl3pPr>
+    <a:lvl4pPr lvl="3" marR="0" rtl="0" algn="l">
+      <a:lnSpc>
+        <a:spcPct val="100000"/>
+      </a:lnSpc>
+      <a:spcBef>
+        <a:spcPts val="0"/>
+      </a:spcBef>
+      <a:spcAft>
+        <a:spcPts val="0"/>
+      </a:spcAft>
+      <a:buClr>
+        <a:srgbClr val="000000"/>
+      </a:buClr>
+      <a:buFont typeface="Arial"/>
+      <a:defRPr b="0" i="0" sz="1400" u="none" cap="none" strike="noStrike">
+        <a:solidFill>
+          <a:srgbClr val="000000"/>
+        </a:solidFill>
+        <a:latin typeface="Arial"/>
+        <a:ea typeface="Arial"/>
+        <a:cs typeface="Arial"/>
+        <a:sym typeface="Arial"/>
+      </a:defRPr>
+    </a:lvl4pPr>
+    <a:lvl5pPr lvl="4" marR="0" rtl="0" algn="l">
+      <a:lnSpc>
+        <a:spcPct val="100000"/>
+      </a:lnSpc>
+      <a:spcBef>
+        <a:spcPts val="0"/>
+      </a:spcBef>
+      <a:spcAft>
+        <a:spcPts val="0"/>
+      </a:spcAft>
+      <a:buClr>
+        <a:srgbClr val="000000"/>
+      </a:buClr>
+      <a:buFont typeface="Arial"/>
+      <a:defRPr b="0" i="0" sz="1400" u="none" cap="none" strike="noStrike">
+        <a:solidFill>
+          <a:srgbClr val="000000"/>
+        </a:solidFill>
+        <a:latin typeface="Arial"/>
+        <a:ea typeface="Arial"/>
+        <a:cs typeface="Arial"/>
+        <a:sym typeface="Arial"/>
+      </a:defRPr>
+    </a:lvl5pPr>
+    <a:lvl6pPr lvl="5" marR="0" rtl="0" algn="l">
+      <a:lnSpc>
+        <a:spcPct val="100000"/>
+      </a:lnSpc>
+      <a:spcBef>
+        <a:spcPts val="0"/>
+      </a:spcBef>
+      <a:spcAft>
+        <a:spcPts val="0"/>
+      </a:spcAft>
+      <a:buClr>
+        <a:srgbClr val="000000"/>
+      </a:buClr>
+      <a:buFont typeface="Arial"/>
+      <a:defRPr b="0" i="0" sz="1400" u="none" cap="none" strike="noStrike">
+        <a:solidFill>
+          <a:srgbClr val="000000"/>
+        </a:solidFill>
+        <a:latin typeface="Arial"/>
+        <a:ea typeface="Arial"/>
+        <a:cs typeface="Arial"/>
+        <a:sym typeface="Arial"/>
+      </a:defRPr>
+    </a:lvl6pPr>
+    <a:lvl7pPr lvl="6" marR="0" rtl="0" algn="l">
+      <a:lnSpc>
+        <a:spcPct val="100000"/>
+      </a:lnSpc>
+      <a:spcBef>
+        <a:spcPts val="0"/>
+      </a:spcBef>
+      <a:spcAft>
+        <a:spcPts val="0"/>
+      </a:spcAft>
+      <a:buClr>
+        <a:srgbClr val="000000"/>
+      </a:buClr>
+      <a:buFont typeface="Arial"/>
+      <a:defRPr b="0" i="0" sz="1400" u="none" cap="none" strike="noStrike">
+        <a:solidFill>
+          <a:srgbClr val="000000"/>
+        </a:solidFill>
+        <a:latin typeface="Arial"/>
+        <a:ea typeface="Arial"/>
+        <a:cs typeface="Arial"/>
+        <a:sym typeface="Arial"/>
+      </a:defRPr>
+    </a:lvl7pPr>
+    <a:lvl8pPr lvl="7" marR="0" rtl="0" algn="l">
+      <a:lnSpc>
+        <a:spcPct val="100000"/>
+      </a:lnSpc>
+      <a:spcBef>
+        <a:spcPts val="0"/>
+      </a:spcBef>
+      <a:spcAft>
+        <a:spcPts val="0"/>
+      </a:spcAft>
+      <a:buClr>
+        <a:srgbClr val="000000"/>
+      </a:buClr>
+      <a:buFont typeface="Arial"/>
+      <a:defRPr b="0" i="0" sz="1400" u="none" cap="none" strike="noStrike">
+        <a:solidFill>
+          <a:srgbClr val="000000"/>
+        </a:solidFill>
+        <a:latin typeface="Arial"/>
+        <a:ea typeface="Arial"/>
+        <a:cs typeface="Arial"/>
+        <a:sym typeface="Arial"/>
+      </a:defRPr>
+    </a:lvl8pPr>
+    <a:lvl9pPr lvl="8" marR="0" rtl="0" algn="l">
+      <a:lnSpc>
+        <a:spcPct val="100000"/>
+      </a:lnSpc>
+      <a:spcBef>
+        <a:spcPts val="0"/>
+      </a:spcBef>
+      <a:spcAft>
+        <a:spcPts val="0"/>
+      </a:spcAft>
+      <a:buClr>
+        <a:srgbClr val="000000"/>
+      </a:buClr>
+      <a:buFont typeface="Arial"/>
+      <a:defRPr b="0" i="0" sz="1400" u="none" cap="none" strike="noStrike">
+        <a:solidFill>
+          <a:srgbClr val="000000"/>
+        </a:solidFill>
+        <a:latin typeface="Arial"/>
+        <a:ea typeface="Arial"/>
+        <a:cs typeface="Arial"/>
+        <a:sym typeface="Arial"/>
+      </a:defRPr>
+    </a:lvl9pPr>
+  </p:notesStyle>
 </p:notesMaster>
 </file>
 
@@ -1318,8 +1574,8 @@
 </file>
 
 <file path=ppt/slideLayouts/slideLayout1.xml><?xml version="1.0" encoding="utf-8"?>
-<p:sldLayout xmlns:a="http://schemas.openxmlformats.org/drawingml/2006/main" xmlns:r="http://schemas.openxmlformats.org/officeDocument/2006/relationships" xmlns:mc="http://schemas.openxmlformats.org/markup-compatibility/2006" xmlns:mv="urn:schemas-microsoft-com:mac:vml" xmlns:p="http://schemas.openxmlformats.org/presentationml/2006/main" xmlns:c="http://schemas.openxmlformats.org/drawingml/2006/chart" xmlns:dgm="http://schemas.openxmlformats.org/drawingml/2006/diagram" xmlns:o="urn:schemas-microsoft-com:office:office" xmlns:v="urn:schemas-microsoft-com:vml" xmlns:pvml="urn:schemas-microsoft-com:office:powerpoint" xmlns:com="http://schemas.openxmlformats.org/drawingml/2006/compatibility" xmlns:p14="http://schemas.microsoft.com/office/powerpoint/2010/main" xmlns:p15="http://schemas.microsoft.com/office/powerpoint/2012/main" type="title">
-  <p:cSld name="Title slide">
+<p:sldLayout xmlns:a="http://schemas.openxmlformats.org/drawingml/2006/main" xmlns:r="http://schemas.openxmlformats.org/officeDocument/2006/relationships" xmlns:mc="http://schemas.openxmlformats.org/markup-compatibility/2006" xmlns:mv="urn:schemas-microsoft-com:mac:vml" xmlns:p="http://schemas.openxmlformats.org/presentationml/2006/main" xmlns:c="http://schemas.openxmlformats.org/drawingml/2006/chart" xmlns:dgm="http://schemas.openxmlformats.org/drawingml/2006/diagram" xmlns:o="urn:schemas-microsoft-com:office:office" xmlns:v="urn:schemas-microsoft-com:vml" xmlns:pvml="urn:schemas-microsoft-com:office:powerpoint" xmlns:com="http://schemas.openxmlformats.org/drawingml/2006/compatibility" xmlns:p14="http://schemas.microsoft.com/office/powerpoint/2010/main" xmlns:p15="http://schemas.microsoft.com/office/powerpoint/2012/main" matchingName="Title slide" type="title">
+  <p:cSld name="TITLE">
     <p:spTree>
       <p:nvGrpSpPr>
         <p:cNvPr id="9" name="Shape 9"/>
@@ -1874,7 +2130,71 @@
           <a:bodyPr anchorCtr="0" anchor="ctr" bIns="91425" lIns="91425" spcFirstLastPara="1" rIns="91425" wrap="square" tIns="91425">
             <a:noAutofit/>
           </a:bodyPr>
-          <a:lstStyle/>
+          <a:lstStyle>
+            <a:lvl1pPr lvl="0">
+              <a:spcBef>
+                <a:spcPts val="0"/>
+              </a:spcBef>
+              <a:buNone/>
+              <a:defRPr/>
+            </a:lvl1pPr>
+            <a:lvl2pPr lvl="1">
+              <a:spcBef>
+                <a:spcPts val="0"/>
+              </a:spcBef>
+              <a:buNone/>
+              <a:defRPr/>
+            </a:lvl2pPr>
+            <a:lvl3pPr lvl="2">
+              <a:spcBef>
+                <a:spcPts val="0"/>
+              </a:spcBef>
+              <a:buNone/>
+              <a:defRPr/>
+            </a:lvl3pPr>
+            <a:lvl4pPr lvl="3">
+              <a:spcBef>
+                <a:spcPts val="0"/>
+              </a:spcBef>
+              <a:buNone/>
+              <a:defRPr/>
+            </a:lvl4pPr>
+            <a:lvl5pPr lvl="4">
+              <a:spcBef>
+                <a:spcPts val="0"/>
+              </a:spcBef>
+              <a:buNone/>
+              <a:defRPr/>
+            </a:lvl5pPr>
+            <a:lvl6pPr lvl="5">
+              <a:spcBef>
+                <a:spcPts val="0"/>
+              </a:spcBef>
+              <a:buNone/>
+              <a:defRPr/>
+            </a:lvl6pPr>
+            <a:lvl7pPr lvl="6">
+              <a:spcBef>
+                <a:spcPts val="0"/>
+              </a:spcBef>
+              <a:buNone/>
+              <a:defRPr/>
+            </a:lvl7pPr>
+            <a:lvl8pPr lvl="7">
+              <a:spcBef>
+                <a:spcPts val="0"/>
+              </a:spcBef>
+              <a:buNone/>
+              <a:defRPr/>
+            </a:lvl8pPr>
+            <a:lvl9pPr lvl="8">
+              <a:spcBef>
+                <a:spcPts val="0"/>
+              </a:spcBef>
+              <a:buNone/>
+              <a:defRPr/>
+            </a:lvl9pPr>
+          </a:lstStyle>
           <a:p>
             <a:pPr indent="0" lvl="0" marL="0">
               <a:spcBef>
@@ -1902,8 +2222,8 @@
 </file>
 
 <file path=ppt/slideLayouts/slideLayout10.xml><?xml version="1.0" encoding="utf-8"?>
-<p:sldLayout xmlns:a="http://schemas.openxmlformats.org/drawingml/2006/main" xmlns:r="http://schemas.openxmlformats.org/officeDocument/2006/relationships" xmlns:mc="http://schemas.openxmlformats.org/markup-compatibility/2006" xmlns:mv="urn:schemas-microsoft-com:mac:vml" xmlns:p="http://schemas.openxmlformats.org/presentationml/2006/main" xmlns:c="http://schemas.openxmlformats.org/drawingml/2006/chart" xmlns:dgm="http://schemas.openxmlformats.org/drawingml/2006/diagram" xmlns:o="urn:schemas-microsoft-com:office:office" xmlns:v="urn:schemas-microsoft-com:vml" xmlns:pvml="urn:schemas-microsoft-com:office:powerpoint" xmlns:com="http://schemas.openxmlformats.org/drawingml/2006/compatibility" xmlns:p14="http://schemas.microsoft.com/office/powerpoint/2010/main" xmlns:p15="http://schemas.microsoft.com/office/powerpoint/2012/main">
-  <p:cSld name="Big number">
+<p:sldLayout xmlns:a="http://schemas.openxmlformats.org/drawingml/2006/main" xmlns:r="http://schemas.openxmlformats.org/officeDocument/2006/relationships" xmlns:mc="http://schemas.openxmlformats.org/markup-compatibility/2006" xmlns:mv="urn:schemas-microsoft-com:mac:vml" xmlns:p="http://schemas.openxmlformats.org/presentationml/2006/main" xmlns:c="http://schemas.openxmlformats.org/drawingml/2006/chart" xmlns:dgm="http://schemas.openxmlformats.org/drawingml/2006/diagram" xmlns:o="urn:schemas-microsoft-com:office:office" xmlns:v="urn:schemas-microsoft-com:vml" xmlns:pvml="urn:schemas-microsoft-com:office:powerpoint" xmlns:com="http://schemas.openxmlformats.org/drawingml/2006/compatibility" xmlns:p14="http://schemas.microsoft.com/office/powerpoint/2010/main" xmlns:p15="http://schemas.microsoft.com/office/powerpoint/2012/main" matchingName="Big number">
+  <p:cSld name="BIG_NUMBER">
     <p:spTree>
       <p:nvGrpSpPr>
         <p:cNvPr id="105" name="Shape 105"/>
@@ -3042,7 +3362,71 @@
           <a:bodyPr anchorCtr="0" anchor="ctr" bIns="91425" lIns="91425" spcFirstLastPara="1" rIns="91425" wrap="square" tIns="91425">
             <a:noAutofit/>
           </a:bodyPr>
-          <a:lstStyle/>
+          <a:lstStyle>
+            <a:lvl1pPr lvl="0">
+              <a:spcBef>
+                <a:spcPts val="0"/>
+              </a:spcBef>
+              <a:buNone/>
+              <a:defRPr/>
+            </a:lvl1pPr>
+            <a:lvl2pPr lvl="1">
+              <a:spcBef>
+                <a:spcPts val="0"/>
+              </a:spcBef>
+              <a:buNone/>
+              <a:defRPr/>
+            </a:lvl2pPr>
+            <a:lvl3pPr lvl="2">
+              <a:spcBef>
+                <a:spcPts val="0"/>
+              </a:spcBef>
+              <a:buNone/>
+              <a:defRPr/>
+            </a:lvl3pPr>
+            <a:lvl4pPr lvl="3">
+              <a:spcBef>
+                <a:spcPts val="0"/>
+              </a:spcBef>
+              <a:buNone/>
+              <a:defRPr/>
+            </a:lvl4pPr>
+            <a:lvl5pPr lvl="4">
+              <a:spcBef>
+                <a:spcPts val="0"/>
+              </a:spcBef>
+              <a:buNone/>
+              <a:defRPr/>
+            </a:lvl5pPr>
+            <a:lvl6pPr lvl="5">
+              <a:spcBef>
+                <a:spcPts val="0"/>
+              </a:spcBef>
+              <a:buNone/>
+              <a:defRPr/>
+            </a:lvl6pPr>
+            <a:lvl7pPr lvl="6">
+              <a:spcBef>
+                <a:spcPts val="0"/>
+              </a:spcBef>
+              <a:buNone/>
+              <a:defRPr/>
+            </a:lvl7pPr>
+            <a:lvl8pPr lvl="7">
+              <a:spcBef>
+                <a:spcPts val="0"/>
+              </a:spcBef>
+              <a:buNone/>
+              <a:defRPr/>
+            </a:lvl8pPr>
+            <a:lvl9pPr lvl="8">
+              <a:spcBef>
+                <a:spcPts val="0"/>
+              </a:spcBef>
+              <a:buNone/>
+              <a:defRPr/>
+            </a:lvl9pPr>
+          </a:lstStyle>
           <a:p>
             <a:pPr indent="0" lvl="0" marL="0">
               <a:spcBef>
@@ -3070,8 +3454,8 @@
 </file>
 
 <file path=ppt/slideLayouts/slideLayout11.xml><?xml version="1.0" encoding="utf-8"?>
-<p:sldLayout xmlns:a="http://schemas.openxmlformats.org/drawingml/2006/main" xmlns:r="http://schemas.openxmlformats.org/officeDocument/2006/relationships" xmlns:mc="http://schemas.openxmlformats.org/markup-compatibility/2006" xmlns:mv="urn:schemas-microsoft-com:mac:vml" xmlns:p="http://schemas.openxmlformats.org/presentationml/2006/main" xmlns:c="http://schemas.openxmlformats.org/drawingml/2006/chart" xmlns:dgm="http://schemas.openxmlformats.org/drawingml/2006/diagram" xmlns:o="urn:schemas-microsoft-com:office:office" xmlns:v="urn:schemas-microsoft-com:vml" xmlns:pvml="urn:schemas-microsoft-com:office:powerpoint" xmlns:com="http://schemas.openxmlformats.org/drawingml/2006/compatibility" xmlns:p14="http://schemas.microsoft.com/office/powerpoint/2010/main" xmlns:p15="http://schemas.microsoft.com/office/powerpoint/2012/main" type="blank">
-  <p:cSld name="Blank">
+<p:sldLayout xmlns:a="http://schemas.openxmlformats.org/drawingml/2006/main" xmlns:r="http://schemas.openxmlformats.org/officeDocument/2006/relationships" xmlns:mc="http://schemas.openxmlformats.org/markup-compatibility/2006" xmlns:mv="urn:schemas-microsoft-com:mac:vml" xmlns:p="http://schemas.openxmlformats.org/presentationml/2006/main" xmlns:c="http://schemas.openxmlformats.org/drawingml/2006/chart" xmlns:dgm="http://schemas.openxmlformats.org/drawingml/2006/diagram" xmlns:o="urn:schemas-microsoft-com:office:office" xmlns:v="urn:schemas-microsoft-com:vml" xmlns:pvml="urn:schemas-microsoft-com:office:powerpoint" xmlns:com="http://schemas.openxmlformats.org/drawingml/2006/compatibility" xmlns:p14="http://schemas.microsoft.com/office/powerpoint/2010/main" xmlns:p15="http://schemas.microsoft.com/office/powerpoint/2012/main" matchingName="Blank" type="blank">
+  <p:cSld name="BLANK">
     <p:spTree>
       <p:nvGrpSpPr>
         <p:cNvPr id="128" name="Shape 128"/>
@@ -3107,7 +3491,71 @@
           <a:bodyPr anchorCtr="0" anchor="ctr" bIns="91425" lIns="91425" spcFirstLastPara="1" rIns="91425" wrap="square" tIns="91425">
             <a:noAutofit/>
           </a:bodyPr>
-          <a:lstStyle/>
+          <a:lstStyle>
+            <a:lvl1pPr lvl="0">
+              <a:spcBef>
+                <a:spcPts val="0"/>
+              </a:spcBef>
+              <a:buNone/>
+              <a:defRPr/>
+            </a:lvl1pPr>
+            <a:lvl2pPr lvl="1">
+              <a:spcBef>
+                <a:spcPts val="0"/>
+              </a:spcBef>
+              <a:buNone/>
+              <a:defRPr/>
+            </a:lvl2pPr>
+            <a:lvl3pPr lvl="2">
+              <a:spcBef>
+                <a:spcPts val="0"/>
+              </a:spcBef>
+              <a:buNone/>
+              <a:defRPr/>
+            </a:lvl3pPr>
+            <a:lvl4pPr lvl="3">
+              <a:spcBef>
+                <a:spcPts val="0"/>
+              </a:spcBef>
+              <a:buNone/>
+              <a:defRPr/>
+            </a:lvl4pPr>
+            <a:lvl5pPr lvl="4">
+              <a:spcBef>
+                <a:spcPts val="0"/>
+              </a:spcBef>
+              <a:buNone/>
+              <a:defRPr/>
+            </a:lvl5pPr>
+            <a:lvl6pPr lvl="5">
+              <a:spcBef>
+                <a:spcPts val="0"/>
+              </a:spcBef>
+              <a:buNone/>
+              <a:defRPr/>
+            </a:lvl6pPr>
+            <a:lvl7pPr lvl="6">
+              <a:spcBef>
+                <a:spcPts val="0"/>
+              </a:spcBef>
+              <a:buNone/>
+              <a:defRPr/>
+            </a:lvl7pPr>
+            <a:lvl8pPr lvl="7">
+              <a:spcBef>
+                <a:spcPts val="0"/>
+              </a:spcBef>
+              <a:buNone/>
+              <a:defRPr/>
+            </a:lvl8pPr>
+            <a:lvl9pPr lvl="8">
+              <a:spcBef>
+                <a:spcPts val="0"/>
+              </a:spcBef>
+              <a:buNone/>
+              <a:defRPr/>
+            </a:lvl9pPr>
+          </a:lstStyle>
           <a:p>
             <a:pPr indent="0" lvl="0" marL="0">
               <a:spcBef>
@@ -3135,8 +3583,8 @@
 </file>
 
 <file path=ppt/slideLayouts/slideLayout2.xml><?xml version="1.0" encoding="utf-8"?>
-<p:sldLayout xmlns:a="http://schemas.openxmlformats.org/drawingml/2006/main" xmlns:r="http://schemas.openxmlformats.org/officeDocument/2006/relationships" xmlns:mc="http://schemas.openxmlformats.org/markup-compatibility/2006" xmlns:mv="urn:schemas-microsoft-com:mac:vml" xmlns:p="http://schemas.openxmlformats.org/presentationml/2006/main" xmlns:c="http://schemas.openxmlformats.org/drawingml/2006/chart" xmlns:dgm="http://schemas.openxmlformats.org/drawingml/2006/diagram" xmlns:o="urn:schemas-microsoft-com:office:office" xmlns:v="urn:schemas-microsoft-com:vml" xmlns:pvml="urn:schemas-microsoft-com:office:powerpoint" xmlns:com="http://schemas.openxmlformats.org/drawingml/2006/compatibility" xmlns:p14="http://schemas.microsoft.com/office/powerpoint/2010/main" xmlns:p15="http://schemas.microsoft.com/office/powerpoint/2012/main" type="secHead">
-  <p:cSld name="Section header">
+<p:sldLayout xmlns:a="http://schemas.openxmlformats.org/drawingml/2006/main" xmlns:r="http://schemas.openxmlformats.org/officeDocument/2006/relationships" xmlns:mc="http://schemas.openxmlformats.org/markup-compatibility/2006" xmlns:mv="urn:schemas-microsoft-com:mac:vml" xmlns:p="http://schemas.openxmlformats.org/presentationml/2006/main" xmlns:c="http://schemas.openxmlformats.org/drawingml/2006/chart" xmlns:dgm="http://schemas.openxmlformats.org/drawingml/2006/diagram" xmlns:o="urn:schemas-microsoft-com:office:office" xmlns:v="urn:schemas-microsoft-com:vml" xmlns:pvml="urn:schemas-microsoft-com:office:powerpoint" xmlns:com="http://schemas.openxmlformats.org/drawingml/2006/compatibility" xmlns:p14="http://schemas.microsoft.com/office/powerpoint/2010/main" xmlns:p15="http://schemas.microsoft.com/office/powerpoint/2012/main" matchingName="Section header" type="secHead">
+  <p:cSld name="SECTION_HEADER">
     <p:spTree>
       <p:nvGrpSpPr>
         <p:cNvPr id="19" name="Shape 19"/>
@@ -4152,7 +4600,71 @@
           <a:bodyPr anchorCtr="0" anchor="ctr" bIns="91425" lIns="91425" spcFirstLastPara="1" rIns="91425" wrap="square" tIns="91425">
             <a:noAutofit/>
           </a:bodyPr>
-          <a:lstStyle/>
+          <a:lstStyle>
+            <a:lvl1pPr lvl="0">
+              <a:spcBef>
+                <a:spcPts val="0"/>
+              </a:spcBef>
+              <a:buNone/>
+              <a:defRPr/>
+            </a:lvl1pPr>
+            <a:lvl2pPr lvl="1">
+              <a:spcBef>
+                <a:spcPts val="0"/>
+              </a:spcBef>
+              <a:buNone/>
+              <a:defRPr/>
+            </a:lvl2pPr>
+            <a:lvl3pPr lvl="2">
+              <a:spcBef>
+                <a:spcPts val="0"/>
+              </a:spcBef>
+              <a:buNone/>
+              <a:defRPr/>
+            </a:lvl3pPr>
+            <a:lvl4pPr lvl="3">
+              <a:spcBef>
+                <a:spcPts val="0"/>
+              </a:spcBef>
+              <a:buNone/>
+              <a:defRPr/>
+            </a:lvl4pPr>
+            <a:lvl5pPr lvl="4">
+              <a:spcBef>
+                <a:spcPts val="0"/>
+              </a:spcBef>
+              <a:buNone/>
+              <a:defRPr/>
+            </a:lvl5pPr>
+            <a:lvl6pPr lvl="5">
+              <a:spcBef>
+                <a:spcPts val="0"/>
+              </a:spcBef>
+              <a:buNone/>
+              <a:defRPr/>
+            </a:lvl6pPr>
+            <a:lvl7pPr lvl="6">
+              <a:spcBef>
+                <a:spcPts val="0"/>
+              </a:spcBef>
+              <a:buNone/>
+              <a:defRPr/>
+            </a:lvl7pPr>
+            <a:lvl8pPr lvl="7">
+              <a:spcBef>
+                <a:spcPts val="0"/>
+              </a:spcBef>
+              <a:buNone/>
+              <a:defRPr/>
+            </a:lvl8pPr>
+            <a:lvl9pPr lvl="8">
+              <a:spcBef>
+                <a:spcPts val="0"/>
+              </a:spcBef>
+              <a:buNone/>
+              <a:defRPr/>
+            </a:lvl9pPr>
+          </a:lstStyle>
           <a:p>
             <a:pPr indent="0" lvl="0" marL="0">
               <a:spcBef>
@@ -4180,8 +4692,8 @@
 </file>
 
 <file path=ppt/slideLayouts/slideLayout3.xml><?xml version="1.0" encoding="utf-8"?>
-<p:sldLayout xmlns:a="http://schemas.openxmlformats.org/drawingml/2006/main" xmlns:r="http://schemas.openxmlformats.org/officeDocument/2006/relationships" xmlns:mc="http://schemas.openxmlformats.org/markup-compatibility/2006" xmlns:mv="urn:schemas-microsoft-com:mac:vml" xmlns:p="http://schemas.openxmlformats.org/presentationml/2006/main" xmlns:c="http://schemas.openxmlformats.org/drawingml/2006/chart" xmlns:dgm="http://schemas.openxmlformats.org/drawingml/2006/diagram" xmlns:o="urn:schemas-microsoft-com:office:office" xmlns:v="urn:schemas-microsoft-com:vml" xmlns:pvml="urn:schemas-microsoft-com:office:powerpoint" xmlns:com="http://schemas.openxmlformats.org/drawingml/2006/compatibility" xmlns:p14="http://schemas.microsoft.com/office/powerpoint/2010/main" xmlns:p15="http://schemas.microsoft.com/office/powerpoint/2012/main" type="tx">
-  <p:cSld name="Title and body">
+<p:sldLayout xmlns:a="http://schemas.openxmlformats.org/drawingml/2006/main" xmlns:r="http://schemas.openxmlformats.org/officeDocument/2006/relationships" xmlns:mc="http://schemas.openxmlformats.org/markup-compatibility/2006" xmlns:mv="urn:schemas-microsoft-com:mac:vml" xmlns:p="http://schemas.openxmlformats.org/presentationml/2006/main" xmlns:c="http://schemas.openxmlformats.org/drawingml/2006/chart" xmlns:dgm="http://schemas.openxmlformats.org/drawingml/2006/diagram" xmlns:o="urn:schemas-microsoft-com:office:office" xmlns:v="urn:schemas-microsoft-com:vml" xmlns:pvml="urn:schemas-microsoft-com:office:powerpoint" xmlns:com="http://schemas.openxmlformats.org/drawingml/2006/compatibility" xmlns:p14="http://schemas.microsoft.com/office/powerpoint/2010/main" xmlns:p15="http://schemas.microsoft.com/office/powerpoint/2012/main" matchingName="Title and body" type="tx">
+  <p:cSld name="TITLE_AND_BODY">
     <p:spTree>
       <p:nvGrpSpPr>
         <p:cNvPr id="41" name="Shape 41"/>
@@ -4568,7 +5080,71 @@
           <a:bodyPr anchorCtr="0" anchor="ctr" bIns="91425" lIns="91425" spcFirstLastPara="1" rIns="91425" wrap="square" tIns="91425">
             <a:noAutofit/>
           </a:bodyPr>
-          <a:lstStyle/>
+          <a:lstStyle>
+            <a:lvl1pPr lvl="0">
+              <a:spcBef>
+                <a:spcPts val="0"/>
+              </a:spcBef>
+              <a:buNone/>
+              <a:defRPr/>
+            </a:lvl1pPr>
+            <a:lvl2pPr lvl="1">
+              <a:spcBef>
+                <a:spcPts val="0"/>
+              </a:spcBef>
+              <a:buNone/>
+              <a:defRPr/>
+            </a:lvl2pPr>
+            <a:lvl3pPr lvl="2">
+              <a:spcBef>
+                <a:spcPts val="0"/>
+              </a:spcBef>
+              <a:buNone/>
+              <a:defRPr/>
+            </a:lvl3pPr>
+            <a:lvl4pPr lvl="3">
+              <a:spcBef>
+                <a:spcPts val="0"/>
+              </a:spcBef>
+              <a:buNone/>
+              <a:defRPr/>
+            </a:lvl4pPr>
+            <a:lvl5pPr lvl="4">
+              <a:spcBef>
+                <a:spcPts val="0"/>
+              </a:spcBef>
+              <a:buNone/>
+              <a:defRPr/>
+            </a:lvl5pPr>
+            <a:lvl6pPr lvl="5">
+              <a:spcBef>
+                <a:spcPts val="0"/>
+              </a:spcBef>
+              <a:buNone/>
+              <a:defRPr/>
+            </a:lvl6pPr>
+            <a:lvl7pPr lvl="6">
+              <a:spcBef>
+                <a:spcPts val="0"/>
+              </a:spcBef>
+              <a:buNone/>
+              <a:defRPr/>
+            </a:lvl7pPr>
+            <a:lvl8pPr lvl="7">
+              <a:spcBef>
+                <a:spcPts val="0"/>
+              </a:spcBef>
+              <a:buNone/>
+              <a:defRPr/>
+            </a:lvl8pPr>
+            <a:lvl9pPr lvl="8">
+              <a:spcBef>
+                <a:spcPts val="0"/>
+              </a:spcBef>
+              <a:buNone/>
+              <a:defRPr/>
+            </a:lvl9pPr>
+          </a:lstStyle>
           <a:p>
             <a:pPr indent="0" lvl="0" marL="0">
               <a:spcBef>
@@ -4596,8 +5172,8 @@
 </file>
 
 <file path=ppt/slideLayouts/slideLayout4.xml><?xml version="1.0" encoding="utf-8"?>
-<p:sldLayout xmlns:a="http://schemas.openxmlformats.org/drawingml/2006/main" xmlns:r="http://schemas.openxmlformats.org/officeDocument/2006/relationships" xmlns:mc="http://schemas.openxmlformats.org/markup-compatibility/2006" xmlns:mv="urn:schemas-microsoft-com:mac:vml" xmlns:p="http://schemas.openxmlformats.org/presentationml/2006/main" xmlns:c="http://schemas.openxmlformats.org/drawingml/2006/chart" xmlns:dgm="http://schemas.openxmlformats.org/drawingml/2006/diagram" xmlns:o="urn:schemas-microsoft-com:office:office" xmlns:v="urn:schemas-microsoft-com:vml" xmlns:pvml="urn:schemas-microsoft-com:office:powerpoint" xmlns:com="http://schemas.openxmlformats.org/drawingml/2006/compatibility" xmlns:p14="http://schemas.microsoft.com/office/powerpoint/2010/main" xmlns:p15="http://schemas.microsoft.com/office/powerpoint/2012/main" type="twoColTx">
-  <p:cSld name="Title and two columns">
+<p:sldLayout xmlns:a="http://schemas.openxmlformats.org/drawingml/2006/main" xmlns:r="http://schemas.openxmlformats.org/officeDocument/2006/relationships" xmlns:mc="http://schemas.openxmlformats.org/markup-compatibility/2006" xmlns:mv="urn:schemas-microsoft-com:mac:vml" xmlns:p="http://schemas.openxmlformats.org/presentationml/2006/main" xmlns:c="http://schemas.openxmlformats.org/drawingml/2006/chart" xmlns:dgm="http://schemas.openxmlformats.org/drawingml/2006/diagram" xmlns:o="urn:schemas-microsoft-com:office:office" xmlns:v="urn:schemas-microsoft-com:vml" xmlns:pvml="urn:schemas-microsoft-com:office:powerpoint" xmlns:com="http://schemas.openxmlformats.org/drawingml/2006/compatibility" xmlns:p14="http://schemas.microsoft.com/office/powerpoint/2010/main" xmlns:p15="http://schemas.microsoft.com/office/powerpoint/2012/main" matchingName="Title and two columns" type="twoColTx">
+  <p:cSld name="TITLE_AND_TWO_COLUMNS">
     <p:spTree>
       <p:nvGrpSpPr>
         <p:cNvPr id="48" name="Shape 48"/>
@@ -5107,7 +5683,71 @@
           <a:bodyPr anchorCtr="0" anchor="ctr" bIns="91425" lIns="91425" spcFirstLastPara="1" rIns="91425" wrap="square" tIns="91425">
             <a:noAutofit/>
           </a:bodyPr>
-          <a:lstStyle/>
+          <a:lstStyle>
+            <a:lvl1pPr lvl="0">
+              <a:spcBef>
+                <a:spcPts val="0"/>
+              </a:spcBef>
+              <a:buNone/>
+              <a:defRPr/>
+            </a:lvl1pPr>
+            <a:lvl2pPr lvl="1">
+              <a:spcBef>
+                <a:spcPts val="0"/>
+              </a:spcBef>
+              <a:buNone/>
+              <a:defRPr/>
+            </a:lvl2pPr>
+            <a:lvl3pPr lvl="2">
+              <a:spcBef>
+                <a:spcPts val="0"/>
+              </a:spcBef>
+              <a:buNone/>
+              <a:defRPr/>
+            </a:lvl3pPr>
+            <a:lvl4pPr lvl="3">
+              <a:spcBef>
+                <a:spcPts val="0"/>
+              </a:spcBef>
+              <a:buNone/>
+              <a:defRPr/>
+            </a:lvl4pPr>
+            <a:lvl5pPr lvl="4">
+              <a:spcBef>
+                <a:spcPts val="0"/>
+              </a:spcBef>
+              <a:buNone/>
+              <a:defRPr/>
+            </a:lvl5pPr>
+            <a:lvl6pPr lvl="5">
+              <a:spcBef>
+                <a:spcPts val="0"/>
+              </a:spcBef>
+              <a:buNone/>
+              <a:defRPr/>
+            </a:lvl6pPr>
+            <a:lvl7pPr lvl="6">
+              <a:spcBef>
+                <a:spcPts val="0"/>
+              </a:spcBef>
+              <a:buNone/>
+              <a:defRPr/>
+            </a:lvl7pPr>
+            <a:lvl8pPr lvl="7">
+              <a:spcBef>
+                <a:spcPts val="0"/>
+              </a:spcBef>
+              <a:buNone/>
+              <a:defRPr/>
+            </a:lvl8pPr>
+            <a:lvl9pPr lvl="8">
+              <a:spcBef>
+                <a:spcPts val="0"/>
+              </a:spcBef>
+              <a:buNone/>
+              <a:defRPr/>
+            </a:lvl9pPr>
+          </a:lstStyle>
           <a:p>
             <a:pPr indent="0" lvl="0" marL="0">
               <a:spcBef>
@@ -5135,8 +5775,8 @@
 </file>
 
 <file path=ppt/slideLayouts/slideLayout5.xml><?xml version="1.0" encoding="utf-8"?>
-<p:sldLayout xmlns:a="http://schemas.openxmlformats.org/drawingml/2006/main" xmlns:r="http://schemas.openxmlformats.org/officeDocument/2006/relationships" xmlns:mc="http://schemas.openxmlformats.org/markup-compatibility/2006" xmlns:mv="urn:schemas-microsoft-com:mac:vml" xmlns:p="http://schemas.openxmlformats.org/presentationml/2006/main" xmlns:c="http://schemas.openxmlformats.org/drawingml/2006/chart" xmlns:dgm="http://schemas.openxmlformats.org/drawingml/2006/diagram" xmlns:o="urn:schemas-microsoft-com:office:office" xmlns:v="urn:schemas-microsoft-com:vml" xmlns:pvml="urn:schemas-microsoft-com:office:powerpoint" xmlns:com="http://schemas.openxmlformats.org/drawingml/2006/compatibility" xmlns:p14="http://schemas.microsoft.com/office/powerpoint/2010/main" xmlns:p15="http://schemas.microsoft.com/office/powerpoint/2012/main" type="titleOnly">
-  <p:cSld name="Title only">
+<p:sldLayout xmlns:a="http://schemas.openxmlformats.org/drawingml/2006/main" xmlns:r="http://schemas.openxmlformats.org/officeDocument/2006/relationships" xmlns:mc="http://schemas.openxmlformats.org/markup-compatibility/2006" xmlns:mv="urn:schemas-microsoft-com:mac:vml" xmlns:p="http://schemas.openxmlformats.org/presentationml/2006/main" xmlns:c="http://schemas.openxmlformats.org/drawingml/2006/chart" xmlns:dgm="http://schemas.openxmlformats.org/drawingml/2006/diagram" xmlns:o="urn:schemas-microsoft-com:office:office" xmlns:v="urn:schemas-microsoft-com:vml" xmlns:pvml="urn:schemas-microsoft-com:office:powerpoint" xmlns:com="http://schemas.openxmlformats.org/drawingml/2006/compatibility" xmlns:p14="http://schemas.microsoft.com/office/powerpoint/2010/main" xmlns:p15="http://schemas.microsoft.com/office/powerpoint/2012/main" matchingName="Title only" type="titleOnly">
+  <p:cSld name="TITLE_ONLY">
     <p:spTree>
       <p:nvGrpSpPr>
         <p:cNvPr id="56" name="Shape 56"/>
@@ -5400,7 +6040,71 @@
           <a:bodyPr anchorCtr="0" anchor="ctr" bIns="91425" lIns="91425" spcFirstLastPara="1" rIns="91425" wrap="square" tIns="91425">
             <a:noAutofit/>
           </a:bodyPr>
-          <a:lstStyle/>
+          <a:lstStyle>
+            <a:lvl1pPr lvl="0">
+              <a:spcBef>
+                <a:spcPts val="0"/>
+              </a:spcBef>
+              <a:buNone/>
+              <a:defRPr/>
+            </a:lvl1pPr>
+            <a:lvl2pPr lvl="1">
+              <a:spcBef>
+                <a:spcPts val="0"/>
+              </a:spcBef>
+              <a:buNone/>
+              <a:defRPr/>
+            </a:lvl2pPr>
+            <a:lvl3pPr lvl="2">
+              <a:spcBef>
+                <a:spcPts val="0"/>
+              </a:spcBef>
+              <a:buNone/>
+              <a:defRPr/>
+            </a:lvl3pPr>
+            <a:lvl4pPr lvl="3">
+              <a:spcBef>
+                <a:spcPts val="0"/>
+              </a:spcBef>
+              <a:buNone/>
+              <a:defRPr/>
+            </a:lvl4pPr>
+            <a:lvl5pPr lvl="4">
+              <a:spcBef>
+                <a:spcPts val="0"/>
+              </a:spcBef>
+              <a:buNone/>
+              <a:defRPr/>
+            </a:lvl5pPr>
+            <a:lvl6pPr lvl="5">
+              <a:spcBef>
+                <a:spcPts val="0"/>
+              </a:spcBef>
+              <a:buNone/>
+              <a:defRPr/>
+            </a:lvl6pPr>
+            <a:lvl7pPr lvl="6">
+              <a:spcBef>
+                <a:spcPts val="0"/>
+              </a:spcBef>
+              <a:buNone/>
+              <a:defRPr/>
+            </a:lvl7pPr>
+            <a:lvl8pPr lvl="7">
+              <a:spcBef>
+                <a:spcPts val="0"/>
+              </a:spcBef>
+              <a:buNone/>
+              <a:defRPr/>
+            </a:lvl8pPr>
+            <a:lvl9pPr lvl="8">
+              <a:spcBef>
+                <a:spcPts val="0"/>
+              </a:spcBef>
+              <a:buNone/>
+              <a:defRPr/>
+            </a:lvl9pPr>
+          </a:lstStyle>
           <a:p>
             <a:pPr indent="0" lvl="0" marL="0">
               <a:spcBef>
@@ -5428,8 +6132,8 @@
 </file>
 
 <file path=ppt/slideLayouts/slideLayout6.xml><?xml version="1.0" encoding="utf-8"?>
-<p:sldLayout xmlns:a="http://schemas.openxmlformats.org/drawingml/2006/main" xmlns:r="http://schemas.openxmlformats.org/officeDocument/2006/relationships" xmlns:mc="http://schemas.openxmlformats.org/markup-compatibility/2006" xmlns:mv="urn:schemas-microsoft-com:mac:vml" xmlns:p="http://schemas.openxmlformats.org/presentationml/2006/main" xmlns:c="http://schemas.openxmlformats.org/drawingml/2006/chart" xmlns:dgm="http://schemas.openxmlformats.org/drawingml/2006/diagram" xmlns:o="urn:schemas-microsoft-com:office:office" xmlns:v="urn:schemas-microsoft-com:vml" xmlns:pvml="urn:schemas-microsoft-com:office:powerpoint" xmlns:com="http://schemas.openxmlformats.org/drawingml/2006/compatibility" xmlns:p14="http://schemas.microsoft.com/office/powerpoint/2010/main" xmlns:p15="http://schemas.microsoft.com/office/powerpoint/2012/main">
-  <p:cSld name="One column text">
+<p:sldLayout xmlns:a="http://schemas.openxmlformats.org/drawingml/2006/main" xmlns:r="http://schemas.openxmlformats.org/officeDocument/2006/relationships" xmlns:mc="http://schemas.openxmlformats.org/markup-compatibility/2006" xmlns:mv="urn:schemas-microsoft-com:mac:vml" xmlns:p="http://schemas.openxmlformats.org/presentationml/2006/main" xmlns:c="http://schemas.openxmlformats.org/drawingml/2006/chart" xmlns:dgm="http://schemas.openxmlformats.org/drawingml/2006/diagram" xmlns:o="urn:schemas-microsoft-com:office:office" xmlns:v="urn:schemas-microsoft-com:vml" xmlns:pvml="urn:schemas-microsoft-com:office:powerpoint" xmlns:com="http://schemas.openxmlformats.org/drawingml/2006/compatibility" xmlns:p14="http://schemas.microsoft.com/office/powerpoint/2010/main" xmlns:p15="http://schemas.microsoft.com/office/powerpoint/2012/main" matchingName="One column text">
+  <p:cSld name="ONE_COLUMN_TEXT">
     <p:spTree>
       <p:nvGrpSpPr>
         <p:cNvPr id="62" name="Shape 62"/>
@@ -5816,7 +6520,71 @@
           <a:bodyPr anchorCtr="0" anchor="ctr" bIns="91425" lIns="91425" spcFirstLastPara="1" rIns="91425" wrap="square" tIns="91425">
             <a:noAutofit/>
           </a:bodyPr>
-          <a:lstStyle/>
+          <a:lstStyle>
+            <a:lvl1pPr lvl="0">
+              <a:spcBef>
+                <a:spcPts val="0"/>
+              </a:spcBef>
+              <a:buNone/>
+              <a:defRPr/>
+            </a:lvl1pPr>
+            <a:lvl2pPr lvl="1">
+              <a:spcBef>
+                <a:spcPts val="0"/>
+              </a:spcBef>
+              <a:buNone/>
+              <a:defRPr/>
+            </a:lvl2pPr>
+            <a:lvl3pPr lvl="2">
+              <a:spcBef>
+                <a:spcPts val="0"/>
+              </a:spcBef>
+              <a:buNone/>
+              <a:defRPr/>
+            </a:lvl3pPr>
+            <a:lvl4pPr lvl="3">
+              <a:spcBef>
+                <a:spcPts val="0"/>
+              </a:spcBef>
+              <a:buNone/>
+              <a:defRPr/>
+            </a:lvl4pPr>
+            <a:lvl5pPr lvl="4">
+              <a:spcBef>
+                <a:spcPts val="0"/>
+              </a:spcBef>
+              <a:buNone/>
+              <a:defRPr/>
+            </a:lvl5pPr>
+            <a:lvl6pPr lvl="5">
+              <a:spcBef>
+                <a:spcPts val="0"/>
+              </a:spcBef>
+              <a:buNone/>
+              <a:defRPr/>
+            </a:lvl6pPr>
+            <a:lvl7pPr lvl="6">
+              <a:spcBef>
+                <a:spcPts val="0"/>
+              </a:spcBef>
+              <a:buNone/>
+              <a:defRPr/>
+            </a:lvl7pPr>
+            <a:lvl8pPr lvl="7">
+              <a:spcBef>
+                <a:spcPts val="0"/>
+              </a:spcBef>
+              <a:buNone/>
+              <a:defRPr/>
+            </a:lvl8pPr>
+            <a:lvl9pPr lvl="8">
+              <a:spcBef>
+                <a:spcPts val="0"/>
+              </a:spcBef>
+              <a:buNone/>
+              <a:defRPr/>
+            </a:lvl9pPr>
+          </a:lstStyle>
           <a:p>
             <a:pPr indent="0" lvl="0" marL="0">
               <a:spcBef>
@@ -5844,8 +6612,8 @@
 </file>
 
 <file path=ppt/slideLayouts/slideLayout7.xml><?xml version="1.0" encoding="utf-8"?>
-<p:sldLayout xmlns:a="http://schemas.openxmlformats.org/drawingml/2006/main" xmlns:r="http://schemas.openxmlformats.org/officeDocument/2006/relationships" xmlns:mc="http://schemas.openxmlformats.org/markup-compatibility/2006" xmlns:mv="urn:schemas-microsoft-com:mac:vml" xmlns:p="http://schemas.openxmlformats.org/presentationml/2006/main" xmlns:c="http://schemas.openxmlformats.org/drawingml/2006/chart" xmlns:dgm="http://schemas.openxmlformats.org/drawingml/2006/diagram" xmlns:o="urn:schemas-microsoft-com:office:office" xmlns:v="urn:schemas-microsoft-com:vml" xmlns:pvml="urn:schemas-microsoft-com:office:powerpoint" xmlns:com="http://schemas.openxmlformats.org/drawingml/2006/compatibility" xmlns:p14="http://schemas.microsoft.com/office/powerpoint/2010/main" xmlns:p15="http://schemas.microsoft.com/office/powerpoint/2012/main">
-  <p:cSld name="Main point">
+<p:sldLayout xmlns:a="http://schemas.openxmlformats.org/drawingml/2006/main" xmlns:r="http://schemas.openxmlformats.org/officeDocument/2006/relationships" xmlns:mc="http://schemas.openxmlformats.org/markup-compatibility/2006" xmlns:mv="urn:schemas-microsoft-com:mac:vml" xmlns:p="http://schemas.openxmlformats.org/presentationml/2006/main" xmlns:c="http://schemas.openxmlformats.org/drawingml/2006/chart" xmlns:dgm="http://schemas.openxmlformats.org/drawingml/2006/diagram" xmlns:o="urn:schemas-microsoft-com:office:office" xmlns:v="urn:schemas-microsoft-com:vml" xmlns:pvml="urn:schemas-microsoft-com:office:powerpoint" xmlns:com="http://schemas.openxmlformats.org/drawingml/2006/compatibility" xmlns:p14="http://schemas.microsoft.com/office/powerpoint/2010/main" xmlns:p15="http://schemas.microsoft.com/office/powerpoint/2012/main" matchingName="Main point">
+  <p:cSld name="MAIN_POINT">
     <p:spTree>
       <p:nvGrpSpPr>
         <p:cNvPr id="69" name="Shape 69"/>
@@ -6861,7 +7629,71 @@
           <a:bodyPr anchorCtr="0" anchor="ctr" bIns="91425" lIns="91425" spcFirstLastPara="1" rIns="91425" wrap="square" tIns="91425">
             <a:noAutofit/>
           </a:bodyPr>
-          <a:lstStyle/>
+          <a:lstStyle>
+            <a:lvl1pPr lvl="0">
+              <a:spcBef>
+                <a:spcPts val="0"/>
+              </a:spcBef>
+              <a:buNone/>
+              <a:defRPr/>
+            </a:lvl1pPr>
+            <a:lvl2pPr lvl="1">
+              <a:spcBef>
+                <a:spcPts val="0"/>
+              </a:spcBef>
+              <a:buNone/>
+              <a:defRPr/>
+            </a:lvl2pPr>
+            <a:lvl3pPr lvl="2">
+              <a:spcBef>
+                <a:spcPts val="0"/>
+              </a:spcBef>
+              <a:buNone/>
+              <a:defRPr/>
+            </a:lvl3pPr>
+            <a:lvl4pPr lvl="3">
+              <a:spcBef>
+                <a:spcPts val="0"/>
+              </a:spcBef>
+              <a:buNone/>
+              <a:defRPr/>
+            </a:lvl4pPr>
+            <a:lvl5pPr lvl="4">
+              <a:spcBef>
+                <a:spcPts val="0"/>
+              </a:spcBef>
+              <a:buNone/>
+              <a:defRPr/>
+            </a:lvl5pPr>
+            <a:lvl6pPr lvl="5">
+              <a:spcBef>
+                <a:spcPts val="0"/>
+              </a:spcBef>
+              <a:buNone/>
+              <a:defRPr/>
+            </a:lvl6pPr>
+            <a:lvl7pPr lvl="6">
+              <a:spcBef>
+                <a:spcPts val="0"/>
+              </a:spcBef>
+              <a:buNone/>
+              <a:defRPr/>
+            </a:lvl7pPr>
+            <a:lvl8pPr lvl="7">
+              <a:spcBef>
+                <a:spcPts val="0"/>
+              </a:spcBef>
+              <a:buNone/>
+              <a:defRPr/>
+            </a:lvl8pPr>
+            <a:lvl9pPr lvl="8">
+              <a:spcBef>
+                <a:spcPts val="0"/>
+              </a:spcBef>
+              <a:buNone/>
+              <a:defRPr/>
+            </a:lvl9pPr>
+          </a:lstStyle>
           <a:p>
             <a:pPr indent="0" lvl="0" marL="0">
               <a:spcBef>
@@ -6889,8 +7721,8 @@
 </file>
 
 <file path=ppt/slideLayouts/slideLayout8.xml><?xml version="1.0" encoding="utf-8"?>
-<p:sldLayout xmlns:a="http://schemas.openxmlformats.org/drawingml/2006/main" xmlns:r="http://schemas.openxmlformats.org/officeDocument/2006/relationships" xmlns:mc="http://schemas.openxmlformats.org/markup-compatibility/2006" xmlns:mv="urn:schemas-microsoft-com:mac:vml" xmlns:p="http://schemas.openxmlformats.org/presentationml/2006/main" xmlns:c="http://schemas.openxmlformats.org/drawingml/2006/chart" xmlns:dgm="http://schemas.openxmlformats.org/drawingml/2006/diagram" xmlns:o="urn:schemas-microsoft-com:office:office" xmlns:v="urn:schemas-microsoft-com:vml" xmlns:pvml="urn:schemas-microsoft-com:office:powerpoint" xmlns:com="http://schemas.openxmlformats.org/drawingml/2006/compatibility" xmlns:p14="http://schemas.microsoft.com/office/powerpoint/2010/main" xmlns:p15="http://schemas.microsoft.com/office/powerpoint/2012/main">
-  <p:cSld name="Section title and description">
+<p:sldLayout xmlns:a="http://schemas.openxmlformats.org/drawingml/2006/main" xmlns:r="http://schemas.openxmlformats.org/officeDocument/2006/relationships" xmlns:mc="http://schemas.openxmlformats.org/markup-compatibility/2006" xmlns:mv="urn:schemas-microsoft-com:mac:vml" xmlns:p="http://schemas.openxmlformats.org/presentationml/2006/main" xmlns:c="http://schemas.openxmlformats.org/drawingml/2006/chart" xmlns:dgm="http://schemas.openxmlformats.org/drawingml/2006/diagram" xmlns:o="urn:schemas-microsoft-com:office:office" xmlns:v="urn:schemas-microsoft-com:vml" xmlns:pvml="urn:schemas-microsoft-com:office:powerpoint" xmlns:com="http://schemas.openxmlformats.org/drawingml/2006/compatibility" xmlns:p14="http://schemas.microsoft.com/office/powerpoint/2010/main" xmlns:p15="http://schemas.microsoft.com/office/powerpoint/2012/main" matchingName="Section title and description">
+  <p:cSld name="SECTION_TITLE_AND_DESCRIPTION">
     <p:spTree>
       <p:nvGrpSpPr>
         <p:cNvPr id="91" name="Shape 91"/>
@@ -7427,7 +8259,71 @@
           <a:bodyPr anchorCtr="0" anchor="ctr" bIns="91425" lIns="91425" spcFirstLastPara="1" rIns="91425" wrap="square" tIns="91425">
             <a:noAutofit/>
           </a:bodyPr>
-          <a:lstStyle/>
+          <a:lstStyle>
+            <a:lvl1pPr lvl="0">
+              <a:spcBef>
+                <a:spcPts val="0"/>
+              </a:spcBef>
+              <a:buNone/>
+              <a:defRPr/>
+            </a:lvl1pPr>
+            <a:lvl2pPr lvl="1">
+              <a:spcBef>
+                <a:spcPts val="0"/>
+              </a:spcBef>
+              <a:buNone/>
+              <a:defRPr/>
+            </a:lvl2pPr>
+            <a:lvl3pPr lvl="2">
+              <a:spcBef>
+                <a:spcPts val="0"/>
+              </a:spcBef>
+              <a:buNone/>
+              <a:defRPr/>
+            </a:lvl3pPr>
+            <a:lvl4pPr lvl="3">
+              <a:spcBef>
+                <a:spcPts val="0"/>
+              </a:spcBef>
+              <a:buNone/>
+              <a:defRPr/>
+            </a:lvl4pPr>
+            <a:lvl5pPr lvl="4">
+              <a:spcBef>
+                <a:spcPts val="0"/>
+              </a:spcBef>
+              <a:buNone/>
+              <a:defRPr/>
+            </a:lvl5pPr>
+            <a:lvl6pPr lvl="5">
+              <a:spcBef>
+                <a:spcPts val="0"/>
+              </a:spcBef>
+              <a:buNone/>
+              <a:defRPr/>
+            </a:lvl6pPr>
+            <a:lvl7pPr lvl="6">
+              <a:spcBef>
+                <a:spcPts val="0"/>
+              </a:spcBef>
+              <a:buNone/>
+              <a:defRPr/>
+            </a:lvl7pPr>
+            <a:lvl8pPr lvl="7">
+              <a:spcBef>
+                <a:spcPts val="0"/>
+              </a:spcBef>
+              <a:buNone/>
+              <a:defRPr/>
+            </a:lvl8pPr>
+            <a:lvl9pPr lvl="8">
+              <a:spcBef>
+                <a:spcPts val="0"/>
+              </a:spcBef>
+              <a:buNone/>
+              <a:defRPr/>
+            </a:lvl9pPr>
+          </a:lstStyle>
           <a:p>
             <a:pPr indent="0" lvl="0" marL="0">
               <a:spcBef>
@@ -7455,8 +8351,8 @@
 </file>
 
 <file path=ppt/slideLayouts/slideLayout9.xml><?xml version="1.0" encoding="utf-8"?>
-<p:sldLayout xmlns:a="http://schemas.openxmlformats.org/drawingml/2006/main" xmlns:r="http://schemas.openxmlformats.org/officeDocument/2006/relationships" xmlns:mc="http://schemas.openxmlformats.org/markup-compatibility/2006" xmlns:mv="urn:schemas-microsoft-com:mac:vml" xmlns:p="http://schemas.openxmlformats.org/presentationml/2006/main" xmlns:c="http://schemas.openxmlformats.org/drawingml/2006/chart" xmlns:dgm="http://schemas.openxmlformats.org/drawingml/2006/diagram" xmlns:o="urn:schemas-microsoft-com:office:office" xmlns:v="urn:schemas-microsoft-com:vml" xmlns:pvml="urn:schemas-microsoft-com:office:powerpoint" xmlns:com="http://schemas.openxmlformats.org/drawingml/2006/compatibility" xmlns:p14="http://schemas.microsoft.com/office/powerpoint/2010/main" xmlns:p15="http://schemas.microsoft.com/office/powerpoint/2012/main">
-  <p:cSld name="Caption">
+<p:sldLayout xmlns:a="http://schemas.openxmlformats.org/drawingml/2006/main" xmlns:r="http://schemas.openxmlformats.org/officeDocument/2006/relationships" xmlns:mc="http://schemas.openxmlformats.org/markup-compatibility/2006" xmlns:mv="urn:schemas-microsoft-com:mac:vml" xmlns:p="http://schemas.openxmlformats.org/presentationml/2006/main" xmlns:c="http://schemas.openxmlformats.org/drawingml/2006/chart" xmlns:dgm="http://schemas.openxmlformats.org/drawingml/2006/diagram" xmlns:o="urn:schemas-microsoft-com:office:office" xmlns:v="urn:schemas-microsoft-com:vml" xmlns:pvml="urn:schemas-microsoft-com:office:powerpoint" xmlns:com="http://schemas.openxmlformats.org/drawingml/2006/compatibility" xmlns:p14="http://schemas.microsoft.com/office/powerpoint/2010/main" xmlns:p15="http://schemas.microsoft.com/office/powerpoint/2012/main" matchingName="Caption">
+  <p:cSld name="CAPTION_ONLY">
     <p:spTree>
       <p:nvGrpSpPr>
         <p:cNvPr id="99" name="Shape 99"/>
@@ -7639,7 +8535,71 @@
           <a:bodyPr anchorCtr="0" anchor="ctr" bIns="91425" lIns="91425" spcFirstLastPara="1" rIns="91425" wrap="square" tIns="91425">
             <a:noAutofit/>
           </a:bodyPr>
-          <a:lstStyle/>
+          <a:lstStyle>
+            <a:lvl1pPr lvl="0">
+              <a:spcBef>
+                <a:spcPts val="0"/>
+              </a:spcBef>
+              <a:buNone/>
+              <a:defRPr/>
+            </a:lvl1pPr>
+            <a:lvl2pPr lvl="1">
+              <a:spcBef>
+                <a:spcPts val="0"/>
+              </a:spcBef>
+              <a:buNone/>
+              <a:defRPr/>
+            </a:lvl2pPr>
+            <a:lvl3pPr lvl="2">
+              <a:spcBef>
+                <a:spcPts val="0"/>
+              </a:spcBef>
+              <a:buNone/>
+              <a:defRPr/>
+            </a:lvl3pPr>
+            <a:lvl4pPr lvl="3">
+              <a:spcBef>
+                <a:spcPts val="0"/>
+              </a:spcBef>
+              <a:buNone/>
+              <a:defRPr/>
+            </a:lvl4pPr>
+            <a:lvl5pPr lvl="4">
+              <a:spcBef>
+                <a:spcPts val="0"/>
+              </a:spcBef>
+              <a:buNone/>
+              <a:defRPr/>
+            </a:lvl5pPr>
+            <a:lvl6pPr lvl="5">
+              <a:spcBef>
+                <a:spcPts val="0"/>
+              </a:spcBef>
+              <a:buNone/>
+              <a:defRPr/>
+            </a:lvl6pPr>
+            <a:lvl7pPr lvl="6">
+              <a:spcBef>
+                <a:spcPts val="0"/>
+              </a:spcBef>
+              <a:buNone/>
+              <a:defRPr/>
+            </a:lvl7pPr>
+            <a:lvl8pPr lvl="7">
+              <a:spcBef>
+                <a:spcPts val="0"/>
+              </a:spcBef>
+              <a:buNone/>
+              <a:defRPr/>
+            </a:lvl8pPr>
+            <a:lvl9pPr lvl="8">
+              <a:spcBef>
+                <a:spcPts val="0"/>
+              </a:spcBef>
+              <a:buNone/>
+              <a:defRPr/>
+            </a:lvl9pPr>
+          </a:lstStyle>
           <a:p>
             <a:pPr indent="0" lvl="0" marL="0">
               <a:spcBef>
@@ -8212,19 +9172,13 @@
           <a:bodyPr anchorCtr="0" anchor="ctr" bIns="91425" lIns="91425" spcFirstLastPara="1" rIns="91425" wrap="square" tIns="91425">
             <a:noAutofit/>
           </a:bodyPr>
-          <a:lstStyle/>
-          <a:p>
-            <a:pPr indent="0" lvl="0" marL="0" algn="r">
-              <a:spcBef>
-                <a:spcPts val="0"/>
-              </a:spcBef>
-              <a:spcAft>
-                <a:spcPts val="0"/>
-              </a:spcAft>
-              <a:buNone/>
-            </a:pPr>
-            <a:fld id="{00000000-1234-1234-1234-123412341234}" type="slidenum">
-              <a:rPr lang="en" sz="1000">
+          <a:lstStyle>
+            <a:lvl1pPr lvl="0" algn="r">
+              <a:spcBef>
+                <a:spcPts val="0"/>
+              </a:spcBef>
+              <a:buNone/>
+              <a:defRPr sz="1000">
                 <a:solidFill>
                   <a:schemeClr val="lt1"/>
                 </a:solidFill>
@@ -8232,18 +9186,144 @@
                 <a:ea typeface="Lato"/>
                 <a:cs typeface="Lato"/>
                 <a:sym typeface="Lato"/>
-              </a:rPr>
+              </a:defRPr>
+            </a:lvl1pPr>
+            <a:lvl2pPr lvl="1" algn="r">
+              <a:spcBef>
+                <a:spcPts val="0"/>
+              </a:spcBef>
+              <a:buNone/>
+              <a:defRPr sz="1000">
+                <a:solidFill>
+                  <a:schemeClr val="lt1"/>
+                </a:solidFill>
+                <a:latin typeface="Lato"/>
+                <a:ea typeface="Lato"/>
+                <a:cs typeface="Lato"/>
+                <a:sym typeface="Lato"/>
+              </a:defRPr>
+            </a:lvl2pPr>
+            <a:lvl3pPr lvl="2" algn="r">
+              <a:spcBef>
+                <a:spcPts val="0"/>
+              </a:spcBef>
+              <a:buNone/>
+              <a:defRPr sz="1000">
+                <a:solidFill>
+                  <a:schemeClr val="lt1"/>
+                </a:solidFill>
+                <a:latin typeface="Lato"/>
+                <a:ea typeface="Lato"/>
+                <a:cs typeface="Lato"/>
+                <a:sym typeface="Lato"/>
+              </a:defRPr>
+            </a:lvl3pPr>
+            <a:lvl4pPr lvl="3" algn="r">
+              <a:spcBef>
+                <a:spcPts val="0"/>
+              </a:spcBef>
+              <a:buNone/>
+              <a:defRPr sz="1000">
+                <a:solidFill>
+                  <a:schemeClr val="lt1"/>
+                </a:solidFill>
+                <a:latin typeface="Lato"/>
+                <a:ea typeface="Lato"/>
+                <a:cs typeface="Lato"/>
+                <a:sym typeface="Lato"/>
+              </a:defRPr>
+            </a:lvl4pPr>
+            <a:lvl5pPr lvl="4" algn="r">
+              <a:spcBef>
+                <a:spcPts val="0"/>
+              </a:spcBef>
+              <a:buNone/>
+              <a:defRPr sz="1000">
+                <a:solidFill>
+                  <a:schemeClr val="lt1"/>
+                </a:solidFill>
+                <a:latin typeface="Lato"/>
+                <a:ea typeface="Lato"/>
+                <a:cs typeface="Lato"/>
+                <a:sym typeface="Lato"/>
+              </a:defRPr>
+            </a:lvl5pPr>
+            <a:lvl6pPr lvl="5" algn="r">
+              <a:spcBef>
+                <a:spcPts val="0"/>
+              </a:spcBef>
+              <a:buNone/>
+              <a:defRPr sz="1000">
+                <a:solidFill>
+                  <a:schemeClr val="lt1"/>
+                </a:solidFill>
+                <a:latin typeface="Lato"/>
+                <a:ea typeface="Lato"/>
+                <a:cs typeface="Lato"/>
+                <a:sym typeface="Lato"/>
+              </a:defRPr>
+            </a:lvl6pPr>
+            <a:lvl7pPr lvl="6" algn="r">
+              <a:spcBef>
+                <a:spcPts val="0"/>
+              </a:spcBef>
+              <a:buNone/>
+              <a:defRPr sz="1000">
+                <a:solidFill>
+                  <a:schemeClr val="lt1"/>
+                </a:solidFill>
+                <a:latin typeface="Lato"/>
+                <a:ea typeface="Lato"/>
+                <a:cs typeface="Lato"/>
+                <a:sym typeface="Lato"/>
+              </a:defRPr>
+            </a:lvl7pPr>
+            <a:lvl8pPr lvl="7" algn="r">
+              <a:spcBef>
+                <a:spcPts val="0"/>
+              </a:spcBef>
+              <a:buNone/>
+              <a:defRPr sz="1000">
+                <a:solidFill>
+                  <a:schemeClr val="lt1"/>
+                </a:solidFill>
+                <a:latin typeface="Lato"/>
+                <a:ea typeface="Lato"/>
+                <a:cs typeface="Lato"/>
+                <a:sym typeface="Lato"/>
+              </a:defRPr>
+            </a:lvl8pPr>
+            <a:lvl9pPr lvl="8" algn="r">
+              <a:spcBef>
+                <a:spcPts val="0"/>
+              </a:spcBef>
+              <a:buNone/>
+              <a:defRPr sz="1000">
+                <a:solidFill>
+                  <a:schemeClr val="lt1"/>
+                </a:solidFill>
+                <a:latin typeface="Lato"/>
+                <a:ea typeface="Lato"/>
+                <a:cs typeface="Lato"/>
+                <a:sym typeface="Lato"/>
+              </a:defRPr>
+            </a:lvl9pPr>
+          </a:lstStyle>
+          <a:p>
+            <a:pPr indent="0" lvl="0" marL="0">
+              <a:spcBef>
+                <a:spcPts val="0"/>
+              </a:spcBef>
+              <a:spcAft>
+                <a:spcPts val="0"/>
+              </a:spcAft>
+              <a:buNone/>
+            </a:pPr>
+            <a:fld id="{00000000-1234-1234-1234-123412341234}" type="slidenum">
+              <a:rPr lang="en"/>
               <a:t>‹#›</a:t>
             </a:fld>
-            <a:endParaRPr sz="1000">
-              <a:solidFill>
-                <a:schemeClr val="lt1"/>
-              </a:solidFill>
-              <a:latin typeface="Lato"/>
-              <a:ea typeface="Lato"/>
-              <a:cs typeface="Lato"/>
-              <a:sym typeface="Lato"/>
-            </a:endParaRPr>
+            <a:endParaRPr/>
           </a:p>
         </p:txBody>
       </p:sp>
@@ -8287,7 +9367,10 @@
         <a:spcAft>
           <a:spcPts val="0"/>
         </a:spcAft>
-        <a:buNone/>
+        <a:buClr>
+          <a:srgbClr val="000000"/>
+        </a:buClr>
+        <a:buFont typeface="Arial"/>
         <a:defRPr b="0" i="0" sz="1400" u="none" cap="none" strike="noStrike">
           <a:solidFill>
             <a:srgbClr val="000000"/>
@@ -8298,6 +9381,198 @@
           <a:sym typeface="Arial"/>
         </a:defRPr>
       </a:lvl1pPr>
+      <a:lvl2pPr lvl="1" marR="0" rtl="0" algn="l">
+        <a:lnSpc>
+          <a:spcPct val="100000"/>
+        </a:lnSpc>
+        <a:spcBef>
+          <a:spcPts val="0"/>
+        </a:spcBef>
+        <a:spcAft>
+          <a:spcPts val="0"/>
+        </a:spcAft>
+        <a:buClr>
+          <a:srgbClr val="000000"/>
+        </a:buClr>
+        <a:buFont typeface="Arial"/>
+        <a:defRPr b="0" i="0" sz="1400" u="none" cap="none" strike="noStrike">
+          <a:solidFill>
+            <a:srgbClr val="000000"/>
+          </a:solidFill>
+          <a:latin typeface="Arial"/>
+          <a:ea typeface="Arial"/>
+          <a:cs typeface="Arial"/>
+          <a:sym typeface="Arial"/>
+        </a:defRPr>
+      </a:lvl2pPr>
+      <a:lvl3pPr lvl="2" marR="0" rtl="0" algn="l">
+        <a:lnSpc>
+          <a:spcPct val="100000"/>
+        </a:lnSpc>
+        <a:spcBef>
+          <a:spcPts val="0"/>
+        </a:spcBef>
+        <a:spcAft>
+          <a:spcPts val="0"/>
+        </a:spcAft>
+        <a:buClr>
+          <a:srgbClr val="000000"/>
+        </a:buClr>
+        <a:buFont typeface="Arial"/>
+        <a:defRPr b="0" i="0" sz="1400" u="none" cap="none" strike="noStrike">
+          <a:solidFill>
+            <a:srgbClr val="000000"/>
+          </a:solidFill>
+          <a:latin typeface="Arial"/>
+          <a:ea typeface="Arial"/>
+          <a:cs typeface="Arial"/>
+          <a:sym typeface="Arial"/>
+        </a:defRPr>
+      </a:lvl3pPr>
+      <a:lvl4pPr lvl="3" marR="0" rtl="0" algn="l">
+        <a:lnSpc>
+          <a:spcPct val="100000"/>
+        </a:lnSpc>
+        <a:spcBef>
+          <a:spcPts val="0"/>
+        </a:spcBef>
+        <a:spcAft>
+          <a:spcPts val="0"/>
+        </a:spcAft>
+        <a:buClr>
+          <a:srgbClr val="000000"/>
+        </a:buClr>
+        <a:buFont typeface="Arial"/>
+        <a:defRPr b="0" i="0" sz="1400" u="none" cap="none" strike="noStrike">
+          <a:solidFill>
+            <a:srgbClr val="000000"/>
+          </a:solidFill>
+          <a:latin typeface="Arial"/>
+          <a:ea typeface="Arial"/>
+          <a:cs typeface="Arial"/>
+          <a:sym typeface="Arial"/>
+        </a:defRPr>
+      </a:lvl4pPr>
+      <a:lvl5pPr lvl="4" marR="0" rtl="0" algn="l">
+        <a:lnSpc>
+          <a:spcPct val="100000"/>
+        </a:lnSpc>
+        <a:spcBef>
+          <a:spcPts val="0"/>
+        </a:spcBef>
+        <a:spcAft>
+          <a:spcPts val="0"/>
+        </a:spcAft>
+        <a:buClr>
+          <a:srgbClr val="000000"/>
+        </a:buClr>
+        <a:buFont typeface="Arial"/>
+        <a:defRPr b="0" i="0" sz="1400" u="none" cap="none" strike="noStrike">
+          <a:solidFill>
+            <a:srgbClr val="000000"/>
+          </a:solidFill>
+          <a:latin typeface="Arial"/>
+          <a:ea typeface="Arial"/>
+          <a:cs typeface="Arial"/>
+          <a:sym typeface="Arial"/>
+        </a:defRPr>
+      </a:lvl5pPr>
+      <a:lvl6pPr lvl="5" marR="0" rtl="0" algn="l">
+        <a:lnSpc>
+          <a:spcPct val="100000"/>
+        </a:lnSpc>
+        <a:spcBef>
+          <a:spcPts val="0"/>
+        </a:spcBef>
+        <a:spcAft>
+          <a:spcPts val="0"/>
+        </a:spcAft>
+        <a:buClr>
+          <a:srgbClr val="000000"/>
+        </a:buClr>
+        <a:buFont typeface="Arial"/>
+        <a:defRPr b="0" i="0" sz="1400" u="none" cap="none" strike="noStrike">
+          <a:solidFill>
+            <a:srgbClr val="000000"/>
+          </a:solidFill>
+          <a:latin typeface="Arial"/>
+          <a:ea typeface="Arial"/>
+          <a:cs typeface="Arial"/>
+          <a:sym typeface="Arial"/>
+        </a:defRPr>
+      </a:lvl6pPr>
+      <a:lvl7pPr lvl="6" marR="0" rtl="0" algn="l">
+        <a:lnSpc>
+          <a:spcPct val="100000"/>
+        </a:lnSpc>
+        <a:spcBef>
+          <a:spcPts val="0"/>
+        </a:spcBef>
+        <a:spcAft>
+          <a:spcPts val="0"/>
+        </a:spcAft>
+        <a:buClr>
+          <a:srgbClr val="000000"/>
+        </a:buClr>
+        <a:buFont typeface="Arial"/>
+        <a:defRPr b="0" i="0" sz="1400" u="none" cap="none" strike="noStrike">
+          <a:solidFill>
+            <a:srgbClr val="000000"/>
+          </a:solidFill>
+          <a:latin typeface="Arial"/>
+          <a:ea typeface="Arial"/>
+          <a:cs typeface="Arial"/>
+          <a:sym typeface="Arial"/>
+        </a:defRPr>
+      </a:lvl7pPr>
+      <a:lvl8pPr lvl="7" marR="0" rtl="0" algn="l">
+        <a:lnSpc>
+          <a:spcPct val="100000"/>
+        </a:lnSpc>
+        <a:spcBef>
+          <a:spcPts val="0"/>
+        </a:spcBef>
+        <a:spcAft>
+          <a:spcPts val="0"/>
+        </a:spcAft>
+        <a:buClr>
+          <a:srgbClr val="000000"/>
+        </a:buClr>
+        <a:buFont typeface="Arial"/>
+        <a:defRPr b="0" i="0" sz="1400" u="none" cap="none" strike="noStrike">
+          <a:solidFill>
+            <a:srgbClr val="000000"/>
+          </a:solidFill>
+          <a:latin typeface="Arial"/>
+          <a:ea typeface="Arial"/>
+          <a:cs typeface="Arial"/>
+          <a:sym typeface="Arial"/>
+        </a:defRPr>
+      </a:lvl8pPr>
+      <a:lvl9pPr lvl="8" marR="0" rtl="0" algn="l">
+        <a:lnSpc>
+          <a:spcPct val="100000"/>
+        </a:lnSpc>
+        <a:spcBef>
+          <a:spcPts val="0"/>
+        </a:spcBef>
+        <a:spcAft>
+          <a:spcPts val="0"/>
+        </a:spcAft>
+        <a:buClr>
+          <a:srgbClr val="000000"/>
+        </a:buClr>
+        <a:buFont typeface="Arial"/>
+        <a:defRPr b="0" i="0" sz="1400" u="none" cap="none" strike="noStrike">
+          <a:solidFill>
+            <a:srgbClr val="000000"/>
+          </a:solidFill>
+          <a:latin typeface="Arial"/>
+          <a:ea typeface="Arial"/>
+          <a:cs typeface="Arial"/>
+          <a:sym typeface="Arial"/>
+        </a:defRPr>
+      </a:lvl9pPr>
     </p:titleStyle>
     <p:bodyStyle>
       <a:defPPr lvl="0" marR="0" rtl="0" algn="l">
@@ -8321,7 +9596,10 @@
         <a:spcAft>
           <a:spcPts val="0"/>
         </a:spcAft>
-        <a:buNone/>
+        <a:buClr>
+          <a:srgbClr val="000000"/>
+        </a:buClr>
+        <a:buFont typeface="Arial"/>
         <a:defRPr b="0" i="0" sz="1400" u="none" cap="none" strike="noStrike">
           <a:solidFill>
             <a:srgbClr val="000000"/>
@@ -8342,7 +9620,10 @@
         <a:spcAft>
           <a:spcPts val="0"/>
         </a:spcAft>
-        <a:buNone/>
+        <a:buClr>
+          <a:srgbClr val="000000"/>
+        </a:buClr>
+        <a:buFont typeface="Arial"/>
         <a:defRPr b="0" i="0" sz="1400" u="none" cap="none" strike="noStrike">
           <a:solidFill>
             <a:srgbClr val="000000"/>
@@ -8363,7 +9644,10 @@
         <a:spcAft>
           <a:spcPts val="0"/>
         </a:spcAft>
-        <a:buNone/>
+        <a:buClr>
+          <a:srgbClr val="000000"/>
+        </a:buClr>
+        <a:buFont typeface="Arial"/>
         <a:defRPr b="0" i="0" sz="1400" u="none" cap="none" strike="noStrike">
           <a:solidFill>
             <a:srgbClr val="000000"/>
@@ -8384,7 +9668,10 @@
         <a:spcAft>
           <a:spcPts val="0"/>
         </a:spcAft>
-        <a:buNone/>
+        <a:buClr>
+          <a:srgbClr val="000000"/>
+        </a:buClr>
+        <a:buFont typeface="Arial"/>
         <a:defRPr b="0" i="0" sz="1400" u="none" cap="none" strike="noStrike">
           <a:solidFill>
             <a:srgbClr val="000000"/>
@@ -8405,7 +9692,10 @@
         <a:spcAft>
           <a:spcPts val="0"/>
         </a:spcAft>
-        <a:buNone/>
+        <a:buClr>
+          <a:srgbClr val="000000"/>
+        </a:buClr>
+        <a:buFont typeface="Arial"/>
         <a:defRPr b="0" i="0" sz="1400" u="none" cap="none" strike="noStrike">
           <a:solidFill>
             <a:srgbClr val="000000"/>
@@ -8426,7 +9716,10 @@
         <a:spcAft>
           <a:spcPts val="0"/>
         </a:spcAft>
-        <a:buNone/>
+        <a:buClr>
+          <a:srgbClr val="000000"/>
+        </a:buClr>
+        <a:buFont typeface="Arial"/>
         <a:defRPr b="0" i="0" sz="1400" u="none" cap="none" strike="noStrike">
           <a:solidFill>
             <a:srgbClr val="000000"/>
@@ -8447,7 +9740,10 @@
         <a:spcAft>
           <a:spcPts val="0"/>
         </a:spcAft>
-        <a:buNone/>
+        <a:buClr>
+          <a:srgbClr val="000000"/>
+        </a:buClr>
+        <a:buFont typeface="Arial"/>
         <a:defRPr b="0" i="0" sz="1400" u="none" cap="none" strike="noStrike">
           <a:solidFill>
             <a:srgbClr val="000000"/>
@@ -8468,7 +9764,10 @@
         <a:spcAft>
           <a:spcPts val="0"/>
         </a:spcAft>
-        <a:buNone/>
+        <a:buClr>
+          <a:srgbClr val="000000"/>
+        </a:buClr>
+        <a:buFont typeface="Arial"/>
         <a:defRPr b="0" i="0" sz="1400" u="none" cap="none" strike="noStrike">
           <a:solidFill>
             <a:srgbClr val="000000"/>
@@ -8489,7 +9788,10 @@
         <a:spcAft>
           <a:spcPts val="0"/>
         </a:spcAft>
-        <a:buNone/>
+        <a:buClr>
+          <a:srgbClr val="000000"/>
+        </a:buClr>
+        <a:buFont typeface="Arial"/>
         <a:defRPr b="0" i="0" sz="1400" u="none" cap="none" strike="noStrike">
           <a:solidFill>
             <a:srgbClr val="000000"/>
@@ -8523,7 +9825,10 @@
         <a:spcAft>
           <a:spcPts val="0"/>
         </a:spcAft>
-        <a:buNone/>
+        <a:buClr>
+          <a:srgbClr val="000000"/>
+        </a:buClr>
+        <a:buFont typeface="Arial"/>
         <a:defRPr b="0" i="0" sz="1400" u="none" cap="none" strike="noStrike">
           <a:solidFill>
             <a:srgbClr val="000000"/>
@@ -8544,7 +9849,10 @@
         <a:spcAft>
           <a:spcPts val="0"/>
         </a:spcAft>
-        <a:buNone/>
+        <a:buClr>
+          <a:srgbClr val="000000"/>
+        </a:buClr>
+        <a:buFont typeface="Arial"/>
         <a:defRPr b="0" i="0" sz="1400" u="none" cap="none" strike="noStrike">
           <a:solidFill>
             <a:srgbClr val="000000"/>
@@ -8565,7 +9873,10 @@
         <a:spcAft>
           <a:spcPts val="0"/>
         </a:spcAft>
-        <a:buNone/>
+        <a:buClr>
+          <a:srgbClr val="000000"/>
+        </a:buClr>
+        <a:buFont typeface="Arial"/>
         <a:defRPr b="0" i="0" sz="1400" u="none" cap="none" strike="noStrike">
           <a:solidFill>
             <a:srgbClr val="000000"/>
@@ -8586,7 +9897,10 @@
         <a:spcAft>
           <a:spcPts val="0"/>
         </a:spcAft>
-        <a:buNone/>
+        <a:buClr>
+          <a:srgbClr val="000000"/>
+        </a:buClr>
+        <a:buFont typeface="Arial"/>
         <a:defRPr b="0" i="0" sz="1400" u="none" cap="none" strike="noStrike">
           <a:solidFill>
             <a:srgbClr val="000000"/>
@@ -8607,7 +9921,10 @@
         <a:spcAft>
           <a:spcPts val="0"/>
         </a:spcAft>
-        <a:buNone/>
+        <a:buClr>
+          <a:srgbClr val="000000"/>
+        </a:buClr>
+        <a:buFont typeface="Arial"/>
         <a:defRPr b="0" i="0" sz="1400" u="none" cap="none" strike="noStrike">
           <a:solidFill>
             <a:srgbClr val="000000"/>
@@ -8628,7 +9945,10 @@
         <a:spcAft>
           <a:spcPts val="0"/>
         </a:spcAft>
-        <a:buNone/>
+        <a:buClr>
+          <a:srgbClr val="000000"/>
+        </a:buClr>
+        <a:buFont typeface="Arial"/>
         <a:defRPr b="0" i="0" sz="1400" u="none" cap="none" strike="noStrike">
           <a:solidFill>
             <a:srgbClr val="000000"/>
@@ -8649,7 +9969,10 @@
         <a:spcAft>
           <a:spcPts val="0"/>
         </a:spcAft>
-        <a:buNone/>
+        <a:buClr>
+          <a:srgbClr val="000000"/>
+        </a:buClr>
+        <a:buFont typeface="Arial"/>
         <a:defRPr b="0" i="0" sz="1400" u="none" cap="none" strike="noStrike">
           <a:solidFill>
             <a:srgbClr val="000000"/>
@@ -8670,7 +9993,10 @@
         <a:spcAft>
           <a:spcPts val="0"/>
         </a:spcAft>
-        <a:buNone/>
+        <a:buClr>
+          <a:srgbClr val="000000"/>
+        </a:buClr>
+        <a:buFont typeface="Arial"/>
         <a:defRPr b="0" i="0" sz="1400" u="none" cap="none" strike="noStrike">
           <a:solidFill>
             <a:srgbClr val="000000"/>
@@ -8691,7 +10017,10 @@
         <a:spcAft>
           <a:spcPts val="0"/>
         </a:spcAft>
-        <a:buNone/>
+        <a:buClr>
+          <a:srgbClr val="000000"/>
+        </a:buClr>
+        <a:buFont typeface="Arial"/>
         <a:defRPr b="0" i="0" sz="1400" u="none" cap="none" strike="noStrike">
           <a:solidFill>
             <a:srgbClr val="000000"/>
@@ -9038,7 +10367,7 @@
             <a:tbl>
               <a:tblPr>
                 <a:noFill/>
-                <a:tableStyleId>{7ABE5C9D-86BD-46DA-8B12-6194F474F7D1}</a:tableStyleId>
+                <a:tableStyleId>{9F5E0BDA-653C-401D-A701-0F8771F005E8}</a:tableStyleId>
               </a:tblPr>
               <a:tblGrid>
                 <a:gridCol w="1375400"/>
@@ -9083,8 +10412,8 @@
                       </a:solidFill>
                       <a:prstDash val="solid"/>
                       <a:round/>
-                      <a:headEnd len="med" w="med" type="none"/>
-                      <a:tailEnd len="med" w="med" type="none"/>
+                      <a:headEnd len="sm" w="sm" type="none"/>
+                      <a:tailEnd len="sm" w="sm" type="none"/>
                     </a:lnR>
                   </a:tcPr>
                 </a:tc>
@@ -9122,8 +10451,8 @@
                       </a:solidFill>
                       <a:prstDash val="solid"/>
                       <a:round/>
-                      <a:headEnd len="med" w="med" type="none"/>
-                      <a:tailEnd len="med" w="med" type="none"/>
+                      <a:headEnd len="sm" w="sm" type="none"/>
+                      <a:tailEnd len="sm" w="sm" type="none"/>
                     </a:lnL>
                     <a:lnR cap="flat" cmpd="sng" w="9525">
                       <a:solidFill>
@@ -9131,8 +10460,8 @@
                       </a:solidFill>
                       <a:prstDash val="solid"/>
                       <a:round/>
-                      <a:headEnd len="med" w="med" type="none"/>
-                      <a:tailEnd len="med" w="med" type="none"/>
+                      <a:headEnd len="sm" w="sm" type="none"/>
+                      <a:tailEnd len="sm" w="sm" type="none"/>
                     </a:lnR>
                     <a:lnT cap="flat" cmpd="sng" w="9525">
                       <a:solidFill>
@@ -9140,8 +10469,8 @@
                       </a:solidFill>
                       <a:prstDash val="solid"/>
                       <a:round/>
-                      <a:headEnd len="med" w="med" type="none"/>
-                      <a:tailEnd len="med" w="med" type="none"/>
+                      <a:headEnd len="sm" w="sm" type="none"/>
+                      <a:tailEnd len="sm" w="sm" type="none"/>
                     </a:lnT>
                     <a:lnB cap="flat" cmpd="sng" w="9525">
                       <a:solidFill>
@@ -9149,8 +10478,8 @@
                       </a:solidFill>
                       <a:prstDash val="solid"/>
                       <a:round/>
-                      <a:headEnd len="med" w="med" type="none"/>
-                      <a:tailEnd len="med" w="med" type="none"/>
+                      <a:headEnd len="sm" w="sm" type="none"/>
+                      <a:tailEnd len="sm" w="sm" type="none"/>
                     </a:lnB>
                   </a:tcPr>
                 </a:tc>
@@ -9188,8 +10517,8 @@
                       </a:solidFill>
                       <a:prstDash val="solid"/>
                       <a:round/>
-                      <a:headEnd len="med" w="med" type="none"/>
-                      <a:tailEnd len="med" w="med" type="none"/>
+                      <a:headEnd len="sm" w="sm" type="none"/>
+                      <a:tailEnd len="sm" w="sm" type="none"/>
                     </a:lnL>
                     <a:lnR cap="flat" cmpd="sng" w="9525">
                       <a:solidFill>
@@ -9197,8 +10526,8 @@
                       </a:solidFill>
                       <a:prstDash val="solid"/>
                       <a:round/>
-                      <a:headEnd len="med" w="med" type="none"/>
-                      <a:tailEnd len="med" w="med" type="none"/>
+                      <a:headEnd len="sm" w="sm" type="none"/>
+                      <a:tailEnd len="sm" w="sm" type="none"/>
                     </a:lnR>
                     <a:lnT cap="flat" cmpd="sng" w="9525">
                       <a:solidFill>
@@ -9206,8 +10535,8 @@
                       </a:solidFill>
                       <a:prstDash val="solid"/>
                       <a:round/>
-                      <a:headEnd len="med" w="med" type="none"/>
-                      <a:tailEnd len="med" w="med" type="none"/>
+                      <a:headEnd len="sm" w="sm" type="none"/>
+                      <a:tailEnd len="sm" w="sm" type="none"/>
                     </a:lnT>
                     <a:lnB cap="flat" cmpd="sng" w="9525">
                       <a:solidFill>
@@ -9215,8 +10544,8 @@
                       </a:solidFill>
                       <a:prstDash val="solid"/>
                       <a:round/>
-                      <a:headEnd len="med" w="med" type="none"/>
-                      <a:tailEnd len="med" w="med" type="none"/>
+                      <a:headEnd len="sm" w="sm" type="none"/>
+                      <a:tailEnd len="sm" w="sm" type="none"/>
                     </a:lnB>
                   </a:tcPr>
                 </a:tc>
@@ -9254,8 +10583,8 @@
                       </a:solidFill>
                       <a:prstDash val="solid"/>
                       <a:round/>
-                      <a:headEnd len="med" w="med" type="none"/>
-                      <a:tailEnd len="med" w="med" type="none"/>
+                      <a:headEnd len="sm" w="sm" type="none"/>
+                      <a:tailEnd len="sm" w="sm" type="none"/>
                     </a:lnL>
                     <a:lnR cap="flat" cmpd="sng" w="9525">
                       <a:solidFill>
@@ -9263,8 +10592,8 @@
                       </a:solidFill>
                       <a:prstDash val="solid"/>
                       <a:round/>
-                      <a:headEnd len="med" w="med" type="none"/>
-                      <a:tailEnd len="med" w="med" type="none"/>
+                      <a:headEnd len="sm" w="sm" type="none"/>
+                      <a:tailEnd len="sm" w="sm" type="none"/>
                     </a:lnR>
                     <a:lnT cap="flat" cmpd="sng" w="9525">
                       <a:solidFill>
@@ -9272,8 +10601,8 @@
                       </a:solidFill>
                       <a:prstDash val="solid"/>
                       <a:round/>
-                      <a:headEnd len="med" w="med" type="none"/>
-                      <a:tailEnd len="med" w="med" type="none"/>
+                      <a:headEnd len="sm" w="sm" type="none"/>
+                      <a:tailEnd len="sm" w="sm" type="none"/>
                     </a:lnT>
                     <a:lnB cap="flat" cmpd="sng" w="9525">
                       <a:solidFill>
@@ -9281,8 +10610,8 @@
                       </a:solidFill>
                       <a:prstDash val="solid"/>
                       <a:round/>
-                      <a:headEnd len="med" w="med" type="none"/>
-                      <a:tailEnd len="med" w="med" type="none"/>
+                      <a:headEnd len="sm" w="sm" type="none"/>
+                      <a:tailEnd len="sm" w="sm" type="none"/>
                     </a:lnB>
                   </a:tcPr>
                 </a:tc>
@@ -9320,8 +10649,8 @@
                       </a:solidFill>
                       <a:prstDash val="solid"/>
                       <a:round/>
-                      <a:headEnd len="med" w="med" type="none"/>
-                      <a:tailEnd len="med" w="med" type="none"/>
+                      <a:headEnd len="sm" w="sm" type="none"/>
+                      <a:tailEnd len="sm" w="sm" type="none"/>
                     </a:lnL>
                     <a:lnR cap="flat" cmpd="sng" w="9525">
                       <a:solidFill>
@@ -9329,8 +10658,8 @@
                       </a:solidFill>
                       <a:prstDash val="solid"/>
                       <a:round/>
-                      <a:headEnd len="med" w="med" type="none"/>
-                      <a:tailEnd len="med" w="med" type="none"/>
+                      <a:headEnd len="sm" w="sm" type="none"/>
+                      <a:tailEnd len="sm" w="sm" type="none"/>
                     </a:lnR>
                     <a:lnT cap="flat" cmpd="sng" w="9525">
                       <a:solidFill>
@@ -9338,8 +10667,8 @@
                       </a:solidFill>
                       <a:prstDash val="solid"/>
                       <a:round/>
-                      <a:headEnd len="med" w="med" type="none"/>
-                      <a:tailEnd len="med" w="med" type="none"/>
+                      <a:headEnd len="sm" w="sm" type="none"/>
+                      <a:tailEnd len="sm" w="sm" type="none"/>
                     </a:lnT>
                     <a:lnB cap="flat" cmpd="sng" w="9525">
                       <a:solidFill>
@@ -9347,8 +10676,8 @@
                       </a:solidFill>
                       <a:prstDash val="solid"/>
                       <a:round/>
-                      <a:headEnd len="med" w="med" type="none"/>
-                      <a:tailEnd len="med" w="med" type="none"/>
+                      <a:headEnd len="sm" w="sm" type="none"/>
+                      <a:tailEnd len="sm" w="sm" type="none"/>
                     </a:lnB>
                   </a:tcPr>
                 </a:tc>
@@ -9386,8 +10715,8 @@
                       </a:solidFill>
                       <a:prstDash val="solid"/>
                       <a:round/>
-                      <a:headEnd len="med" w="med" type="none"/>
-                      <a:tailEnd len="med" w="med" type="none"/>
+                      <a:headEnd len="sm" w="sm" type="none"/>
+                      <a:tailEnd len="sm" w="sm" type="none"/>
                     </a:lnL>
                   </a:tcPr>
                 </a:tc>
@@ -9431,8 +10760,8 @@
                       </a:solidFill>
                       <a:prstDash val="solid"/>
                       <a:round/>
-                      <a:headEnd len="med" w="med" type="none"/>
-                      <a:tailEnd len="med" w="med" type="none"/>
+                      <a:headEnd len="sm" w="sm" type="none"/>
+                      <a:tailEnd len="sm" w="sm" type="none"/>
                     </a:lnR>
                   </a:tcPr>
                 </a:tc>
@@ -9474,8 +10803,8 @@
                       </a:solidFill>
                       <a:prstDash val="solid"/>
                       <a:round/>
-                      <a:headEnd len="med" w="med" type="none"/>
-                      <a:tailEnd len="med" w="med" type="none"/>
+                      <a:headEnd len="sm" w="sm" type="none"/>
+                      <a:tailEnd len="sm" w="sm" type="none"/>
                     </a:lnL>
                     <a:lnR cap="flat" cmpd="sng" w="9525">
                       <a:solidFill>
@@ -9483,8 +10812,8 @@
                       </a:solidFill>
                       <a:prstDash val="solid"/>
                       <a:round/>
-                      <a:headEnd len="med" w="med" type="none"/>
-                      <a:tailEnd len="med" w="med" type="none"/>
+                      <a:headEnd len="sm" w="sm" type="none"/>
+                      <a:tailEnd len="sm" w="sm" type="none"/>
                     </a:lnR>
                     <a:lnT cap="flat" cmpd="sng" w="9525">
                       <a:solidFill>
@@ -9492,8 +10821,8 @@
                       </a:solidFill>
                       <a:prstDash val="solid"/>
                       <a:round/>
-                      <a:headEnd len="med" w="med" type="none"/>
-                      <a:tailEnd len="med" w="med" type="none"/>
+                      <a:headEnd len="sm" w="sm" type="none"/>
+                      <a:tailEnd len="sm" w="sm" type="none"/>
                     </a:lnT>
                     <a:lnB cap="flat" cmpd="sng" w="9525">
                       <a:solidFill>
@@ -9501,8 +10830,8 @@
                       </a:solidFill>
                       <a:prstDash val="solid"/>
                       <a:round/>
-                      <a:headEnd len="med" w="med" type="none"/>
-                      <a:tailEnd len="med" w="med" type="none"/>
+                      <a:headEnd len="sm" w="sm" type="none"/>
+                      <a:tailEnd len="sm" w="sm" type="none"/>
                     </a:lnB>
                   </a:tcPr>
                 </a:tc>
@@ -9544,8 +10873,8 @@
                       </a:solidFill>
                       <a:prstDash val="solid"/>
                       <a:round/>
-                      <a:headEnd len="med" w="med" type="none"/>
-                      <a:tailEnd len="med" w="med" type="none"/>
+                      <a:headEnd len="sm" w="sm" type="none"/>
+                      <a:tailEnd len="sm" w="sm" type="none"/>
                     </a:lnL>
                     <a:lnR cap="flat" cmpd="sng" w="9525">
                       <a:solidFill>
@@ -9553,8 +10882,8 @@
                       </a:solidFill>
                       <a:prstDash val="solid"/>
                       <a:round/>
-                      <a:headEnd len="med" w="med" type="none"/>
-                      <a:tailEnd len="med" w="med" type="none"/>
+                      <a:headEnd len="sm" w="sm" type="none"/>
+                      <a:tailEnd len="sm" w="sm" type="none"/>
                     </a:lnR>
                     <a:lnT cap="flat" cmpd="sng" w="9525">
                       <a:solidFill>
@@ -9562,8 +10891,8 @@
                       </a:solidFill>
                       <a:prstDash val="solid"/>
                       <a:round/>
-                      <a:headEnd len="med" w="med" type="none"/>
-                      <a:tailEnd len="med" w="med" type="none"/>
+                      <a:headEnd len="sm" w="sm" type="none"/>
+                      <a:tailEnd len="sm" w="sm" type="none"/>
                     </a:lnT>
                     <a:lnB cap="flat" cmpd="sng" w="9525">
                       <a:solidFill>
@@ -9571,8 +10900,8 @@
                       </a:solidFill>
                       <a:prstDash val="solid"/>
                       <a:round/>
-                      <a:headEnd len="med" w="med" type="none"/>
-                      <a:tailEnd len="med" w="med" type="none"/>
+                      <a:headEnd len="sm" w="sm" type="none"/>
+                      <a:tailEnd len="sm" w="sm" type="none"/>
                     </a:lnB>
                   </a:tcPr>
                 </a:tc>
@@ -9614,8 +10943,8 @@
                       </a:solidFill>
                       <a:prstDash val="solid"/>
                       <a:round/>
-                      <a:headEnd len="med" w="med" type="none"/>
-                      <a:tailEnd len="med" w="med" type="none"/>
+                      <a:headEnd len="sm" w="sm" type="none"/>
+                      <a:tailEnd len="sm" w="sm" type="none"/>
                     </a:lnL>
                     <a:lnR cap="flat" cmpd="sng" w="9525">
                       <a:solidFill>
@@ -9623,8 +10952,8 @@
                       </a:solidFill>
                       <a:prstDash val="solid"/>
                       <a:round/>
-                      <a:headEnd len="med" w="med" type="none"/>
-                      <a:tailEnd len="med" w="med" type="none"/>
+                      <a:headEnd len="sm" w="sm" type="none"/>
+                      <a:tailEnd len="sm" w="sm" type="none"/>
                     </a:lnR>
                     <a:lnT cap="flat" cmpd="sng" w="9525">
                       <a:solidFill>
@@ -9632,8 +10961,8 @@
                       </a:solidFill>
                       <a:prstDash val="solid"/>
                       <a:round/>
-                      <a:headEnd len="med" w="med" type="none"/>
-                      <a:tailEnd len="med" w="med" type="none"/>
+                      <a:headEnd len="sm" w="sm" type="none"/>
+                      <a:tailEnd len="sm" w="sm" type="none"/>
                     </a:lnT>
                     <a:lnB cap="flat" cmpd="sng" w="9525">
                       <a:solidFill>
@@ -9641,8 +10970,8 @@
                       </a:solidFill>
                       <a:prstDash val="solid"/>
                       <a:round/>
-                      <a:headEnd len="med" w="med" type="none"/>
-                      <a:tailEnd len="med" w="med" type="none"/>
+                      <a:headEnd len="sm" w="sm" type="none"/>
+                      <a:tailEnd len="sm" w="sm" type="none"/>
                     </a:lnB>
                   </a:tcPr>
                 </a:tc>
@@ -9684,8 +11013,8 @@
                       </a:solidFill>
                       <a:prstDash val="solid"/>
                       <a:round/>
-                      <a:headEnd len="med" w="med" type="none"/>
-                      <a:tailEnd len="med" w="med" type="none"/>
+                      <a:headEnd len="sm" w="sm" type="none"/>
+                      <a:tailEnd len="sm" w="sm" type="none"/>
                     </a:lnL>
                     <a:lnR cap="flat" cmpd="sng" w="9525">
                       <a:solidFill>
@@ -9693,8 +11022,8 @@
                       </a:solidFill>
                       <a:prstDash val="solid"/>
                       <a:round/>
-                      <a:headEnd len="med" w="med" type="none"/>
-                      <a:tailEnd len="med" w="med" type="none"/>
+                      <a:headEnd len="sm" w="sm" type="none"/>
+                      <a:tailEnd len="sm" w="sm" type="none"/>
                     </a:lnR>
                     <a:lnT cap="flat" cmpd="sng" w="9525">
                       <a:solidFill>
@@ -9702,8 +11031,8 @@
                       </a:solidFill>
                       <a:prstDash val="solid"/>
                       <a:round/>
-                      <a:headEnd len="med" w="med" type="none"/>
-                      <a:tailEnd len="med" w="med" type="none"/>
+                      <a:headEnd len="sm" w="sm" type="none"/>
+                      <a:tailEnd len="sm" w="sm" type="none"/>
                     </a:lnT>
                     <a:lnB cap="flat" cmpd="sng" w="9525">
                       <a:solidFill>
@@ -9711,8 +11040,8 @@
                       </a:solidFill>
                       <a:prstDash val="solid"/>
                       <a:round/>
-                      <a:headEnd len="med" w="med" type="none"/>
-                      <a:tailEnd len="med" w="med" type="none"/>
+                      <a:headEnd len="sm" w="sm" type="none"/>
+                      <a:tailEnd len="sm" w="sm" type="none"/>
                     </a:lnB>
                   </a:tcPr>
                 </a:tc>
@@ -9749,8 +11078,8 @@
                       </a:solidFill>
                       <a:prstDash val="solid"/>
                       <a:round/>
-                      <a:headEnd len="med" w="med" type="none"/>
-                      <a:tailEnd len="med" w="med" type="none"/>
+                      <a:headEnd len="sm" w="sm" type="none"/>
+                      <a:tailEnd len="sm" w="sm" type="none"/>
                     </a:lnL>
                   </a:tcPr>
                 </a:tc>
@@ -9790,8 +11119,8 @@
                       </a:solidFill>
                       <a:prstDash val="solid"/>
                       <a:round/>
-                      <a:headEnd len="med" w="med" type="none"/>
-                      <a:tailEnd len="med" w="med" type="none"/>
+                      <a:headEnd len="sm" w="sm" type="none"/>
+                      <a:tailEnd len="sm" w="sm" type="none"/>
                     </a:lnR>
                     <a:lnB cap="flat" cmpd="sng" w="9525">
                       <a:solidFill>
@@ -9799,8 +11128,8 @@
                       </a:solidFill>
                       <a:prstDash val="solid"/>
                       <a:round/>
-                      <a:headEnd len="med" w="med" type="none"/>
-                      <a:tailEnd len="med" w="med" type="none"/>
+                      <a:headEnd len="sm" w="sm" type="none"/>
+                      <a:tailEnd len="sm" w="sm" type="none"/>
                     </a:lnB>
                   </a:tcPr>
                 </a:tc>
@@ -9838,8 +11167,8 @@
                       </a:solidFill>
                       <a:prstDash val="solid"/>
                       <a:round/>
-                      <a:headEnd len="med" w="med" type="none"/>
-                      <a:tailEnd len="med" w="med" type="none"/>
+                      <a:headEnd len="sm" w="sm" type="none"/>
+                      <a:tailEnd len="sm" w="sm" type="none"/>
                     </a:lnL>
                     <a:lnR cap="flat" cmpd="sng" w="9525">
                       <a:solidFill>
@@ -9847,8 +11176,8 @@
                       </a:solidFill>
                       <a:prstDash val="solid"/>
                       <a:round/>
-                      <a:headEnd len="med" w="med" type="none"/>
-                      <a:tailEnd len="med" w="med" type="none"/>
+                      <a:headEnd len="sm" w="sm" type="none"/>
+                      <a:tailEnd len="sm" w="sm" type="none"/>
                     </a:lnR>
                     <a:lnT cap="flat" cmpd="sng" w="9525">
                       <a:solidFill>
@@ -9856,8 +11185,8 @@
                       </a:solidFill>
                       <a:prstDash val="solid"/>
                       <a:round/>
-                      <a:headEnd len="med" w="med" type="none"/>
-                      <a:tailEnd len="med" w="med" type="none"/>
+                      <a:headEnd len="sm" w="sm" type="none"/>
+                      <a:tailEnd len="sm" w="sm" type="none"/>
                     </a:lnT>
                     <a:lnB cap="flat" cmpd="sng" w="9525">
                       <a:solidFill>
@@ -9865,8 +11194,8 @@
                       </a:solidFill>
                       <a:prstDash val="solid"/>
                       <a:round/>
-                      <a:headEnd len="med" w="med" type="none"/>
-                      <a:tailEnd len="med" w="med" type="none"/>
+                      <a:headEnd len="sm" w="sm" type="none"/>
+                      <a:tailEnd len="sm" w="sm" type="none"/>
                     </a:lnB>
                   </a:tcPr>
                 </a:tc>
@@ -9904,8 +11233,8 @@
                       </a:solidFill>
                       <a:prstDash val="solid"/>
                       <a:round/>
-                      <a:headEnd len="med" w="med" type="none"/>
-                      <a:tailEnd len="med" w="med" type="none"/>
+                      <a:headEnd len="sm" w="sm" type="none"/>
+                      <a:tailEnd len="sm" w="sm" type="none"/>
                     </a:lnL>
                     <a:lnR cap="flat" cmpd="sng" w="9525">
                       <a:solidFill>
@@ -9913,8 +11242,8 @@
                       </a:solidFill>
                       <a:prstDash val="solid"/>
                       <a:round/>
-                      <a:headEnd len="med" w="med" type="none"/>
-                      <a:tailEnd len="med" w="med" type="none"/>
+                      <a:headEnd len="sm" w="sm" type="none"/>
+                      <a:tailEnd len="sm" w="sm" type="none"/>
                     </a:lnR>
                     <a:lnT cap="flat" cmpd="sng" w="9525">
                       <a:solidFill>
@@ -9922,8 +11251,8 @@
                       </a:solidFill>
                       <a:prstDash val="solid"/>
                       <a:round/>
-                      <a:headEnd len="med" w="med" type="none"/>
-                      <a:tailEnd len="med" w="med" type="none"/>
+                      <a:headEnd len="sm" w="sm" type="none"/>
+                      <a:tailEnd len="sm" w="sm" type="none"/>
                     </a:lnT>
                     <a:lnB cap="flat" cmpd="sng" w="9525">
                       <a:solidFill>
@@ -9931,8 +11260,8 @@
                       </a:solidFill>
                       <a:prstDash val="solid"/>
                       <a:round/>
-                      <a:headEnd len="med" w="med" type="none"/>
-                      <a:tailEnd len="med" w="med" type="none"/>
+                      <a:headEnd len="sm" w="sm" type="none"/>
+                      <a:tailEnd len="sm" w="sm" type="none"/>
                     </a:lnB>
                   </a:tcPr>
                 </a:tc>
@@ -9970,8 +11299,8 @@
                       </a:solidFill>
                       <a:prstDash val="solid"/>
                       <a:round/>
-                      <a:headEnd len="med" w="med" type="none"/>
-                      <a:tailEnd len="med" w="med" type="none"/>
+                      <a:headEnd len="sm" w="sm" type="none"/>
+                      <a:tailEnd len="sm" w="sm" type="none"/>
                     </a:lnL>
                     <a:lnR cap="flat" cmpd="sng" w="9525">
                       <a:solidFill>
@@ -9979,8 +11308,8 @@
                       </a:solidFill>
                       <a:prstDash val="solid"/>
                       <a:round/>
-                      <a:headEnd len="med" w="med" type="none"/>
-                      <a:tailEnd len="med" w="med" type="none"/>
+                      <a:headEnd len="sm" w="sm" type="none"/>
+                      <a:tailEnd len="sm" w="sm" type="none"/>
                     </a:lnR>
                     <a:lnT cap="flat" cmpd="sng" w="9525">
                       <a:solidFill>
@@ -9988,8 +11317,8 @@
                       </a:solidFill>
                       <a:prstDash val="solid"/>
                       <a:round/>
-                      <a:headEnd len="med" w="med" type="none"/>
-                      <a:tailEnd len="med" w="med" type="none"/>
+                      <a:headEnd len="sm" w="sm" type="none"/>
+                      <a:tailEnd len="sm" w="sm" type="none"/>
                     </a:lnT>
                     <a:lnB cap="flat" cmpd="sng" w="9525">
                       <a:solidFill>
@@ -9997,8 +11326,8 @@
                       </a:solidFill>
                       <a:prstDash val="solid"/>
                       <a:round/>
-                      <a:headEnd len="med" w="med" type="none"/>
-                      <a:tailEnd len="med" w="med" type="none"/>
+                      <a:headEnd len="sm" w="sm" type="none"/>
+                      <a:tailEnd len="sm" w="sm" type="none"/>
                     </a:lnB>
                   </a:tcPr>
                 </a:tc>
@@ -10036,8 +11365,8 @@
                       </a:solidFill>
                       <a:prstDash val="solid"/>
                       <a:round/>
-                      <a:headEnd len="med" w="med" type="none"/>
-                      <a:tailEnd len="med" w="med" type="none"/>
+                      <a:headEnd len="sm" w="sm" type="none"/>
+                      <a:tailEnd len="sm" w="sm" type="none"/>
                     </a:lnL>
                     <a:lnR cap="flat" cmpd="sng" w="9525">
                       <a:solidFill>
@@ -10045,8 +11374,8 @@
                       </a:solidFill>
                       <a:prstDash val="solid"/>
                       <a:round/>
-                      <a:headEnd len="med" w="med" type="none"/>
-                      <a:tailEnd len="med" w="med" type="none"/>
+                      <a:headEnd len="sm" w="sm" type="none"/>
+                      <a:tailEnd len="sm" w="sm" type="none"/>
                     </a:lnR>
                     <a:lnT cap="flat" cmpd="sng" w="9525">
                       <a:solidFill>
@@ -10054,8 +11383,8 @@
                       </a:solidFill>
                       <a:prstDash val="solid"/>
                       <a:round/>
-                      <a:headEnd len="med" w="med" type="none"/>
-                      <a:tailEnd len="med" w="med" type="none"/>
+                      <a:headEnd len="sm" w="sm" type="none"/>
+                      <a:tailEnd len="sm" w="sm" type="none"/>
                     </a:lnT>
                     <a:lnB cap="flat" cmpd="sng" w="9525">
                       <a:solidFill>
@@ -10063,8 +11392,8 @@
                       </a:solidFill>
                       <a:prstDash val="solid"/>
                       <a:round/>
-                      <a:headEnd len="med" w="med" type="none"/>
-                      <a:tailEnd len="med" w="med" type="none"/>
+                      <a:headEnd len="sm" w="sm" type="none"/>
+                      <a:tailEnd len="sm" w="sm" type="none"/>
                     </a:lnB>
                   </a:tcPr>
                 </a:tc>
@@ -10102,8 +11431,8 @@
                       </a:solidFill>
                       <a:prstDash val="solid"/>
                       <a:round/>
-                      <a:headEnd len="med" w="med" type="none"/>
-                      <a:tailEnd len="med" w="med" type="none"/>
+                      <a:headEnd len="sm" w="sm" type="none"/>
+                      <a:tailEnd len="sm" w="sm" type="none"/>
                     </a:lnL>
                     <a:lnB cap="flat" cmpd="sng" w="9525">
                       <a:solidFill>
@@ -10111,8 +11440,8 @@
                       </a:solidFill>
                       <a:prstDash val="solid"/>
                       <a:round/>
-                      <a:headEnd len="med" w="med" type="none"/>
-                      <a:tailEnd len="med" w="med" type="none"/>
+                      <a:headEnd len="sm" w="sm" type="none"/>
+                      <a:tailEnd len="sm" w="sm" type="none"/>
                     </a:lnB>
                   </a:tcPr>
                 </a:tc>
@@ -10156,8 +11485,8 @@
                       </a:solidFill>
                       <a:prstDash val="solid"/>
                       <a:round/>
-                      <a:headEnd len="med" w="med" type="none"/>
-                      <a:tailEnd len="med" w="med" type="none"/>
+                      <a:headEnd len="sm" w="sm" type="none"/>
+                      <a:tailEnd len="sm" w="sm" type="none"/>
                     </a:lnL>
                     <a:lnR cap="flat" cmpd="sng" w="9525">
                       <a:solidFill>
@@ -10165,8 +11494,8 @@
                       </a:solidFill>
                       <a:prstDash val="solid"/>
                       <a:round/>
-                      <a:headEnd len="med" w="med" type="none"/>
-                      <a:tailEnd len="med" w="med" type="none"/>
+                      <a:headEnd len="sm" w="sm" type="none"/>
+                      <a:tailEnd len="sm" w="sm" type="none"/>
                     </a:lnR>
                     <a:lnT cap="flat" cmpd="sng" w="9525">
                       <a:solidFill>
@@ -10174,8 +11503,8 @@
                       </a:solidFill>
                       <a:prstDash val="solid"/>
                       <a:round/>
-                      <a:headEnd len="med" w="med" type="none"/>
-                      <a:tailEnd len="med" w="med" type="none"/>
+                      <a:headEnd len="sm" w="sm" type="none"/>
+                      <a:tailEnd len="sm" w="sm" type="none"/>
                     </a:lnT>
                     <a:lnB cap="flat" cmpd="sng" w="9525">
                       <a:solidFill>
@@ -10183,8 +11512,8 @@
                       </a:solidFill>
                       <a:prstDash val="solid"/>
                       <a:round/>
-                      <a:headEnd len="med" w="med" type="none"/>
-                      <a:tailEnd len="med" w="med" type="none"/>
+                      <a:headEnd len="sm" w="sm" type="none"/>
+                      <a:tailEnd len="sm" w="sm" type="none"/>
                     </a:lnB>
                   </a:tcPr>
                 </a:tc>
@@ -10226,8 +11555,8 @@
                       </a:solidFill>
                       <a:prstDash val="solid"/>
                       <a:round/>
-                      <a:headEnd len="med" w="med" type="none"/>
-                      <a:tailEnd len="med" w="med" type="none"/>
+                      <a:headEnd len="sm" w="sm" type="none"/>
+                      <a:tailEnd len="sm" w="sm" type="none"/>
                     </a:lnL>
                     <a:lnR cap="flat" cmpd="sng" w="9525">
                       <a:solidFill>
@@ -10235,8 +11564,8 @@
                       </a:solidFill>
                       <a:prstDash val="solid"/>
                       <a:round/>
-                      <a:headEnd len="med" w="med" type="none"/>
-                      <a:tailEnd len="med" w="med" type="none"/>
+                      <a:headEnd len="sm" w="sm" type="none"/>
+                      <a:tailEnd len="sm" w="sm" type="none"/>
                     </a:lnR>
                     <a:lnT cap="flat" cmpd="sng" w="9525">
                       <a:solidFill>
@@ -10244,8 +11573,8 @@
                       </a:solidFill>
                       <a:prstDash val="solid"/>
                       <a:round/>
-                      <a:headEnd len="med" w="med" type="none"/>
-                      <a:tailEnd len="med" w="med" type="none"/>
+                      <a:headEnd len="sm" w="sm" type="none"/>
+                      <a:tailEnd len="sm" w="sm" type="none"/>
                     </a:lnT>
                     <a:lnB cap="flat" cmpd="sng" w="9525">
                       <a:solidFill>
@@ -10253,8 +11582,8 @@
                       </a:solidFill>
                       <a:prstDash val="solid"/>
                       <a:round/>
-                      <a:headEnd len="med" w="med" type="none"/>
-                      <a:tailEnd len="med" w="med" type="none"/>
+                      <a:headEnd len="sm" w="sm" type="none"/>
+                      <a:tailEnd len="sm" w="sm" type="none"/>
                     </a:lnB>
                   </a:tcPr>
                 </a:tc>
@@ -10296,8 +11625,8 @@
                       </a:solidFill>
                       <a:prstDash val="solid"/>
                       <a:round/>
-                      <a:headEnd len="med" w="med" type="none"/>
-                      <a:tailEnd len="med" w="med" type="none"/>
+                      <a:headEnd len="sm" w="sm" type="none"/>
+                      <a:tailEnd len="sm" w="sm" type="none"/>
                     </a:lnL>
                     <a:lnR cap="flat" cmpd="sng" w="9525">
                       <a:solidFill>
@@ -10305,8 +11634,8 @@
                       </a:solidFill>
                       <a:prstDash val="solid"/>
                       <a:round/>
-                      <a:headEnd len="med" w="med" type="none"/>
-                      <a:tailEnd len="med" w="med" type="none"/>
+                      <a:headEnd len="sm" w="sm" type="none"/>
+                      <a:tailEnd len="sm" w="sm" type="none"/>
                     </a:lnR>
                     <a:lnT cap="flat" cmpd="sng" w="9525">
                       <a:solidFill>
@@ -10314,8 +11643,8 @@
                       </a:solidFill>
                       <a:prstDash val="solid"/>
                       <a:round/>
-                      <a:headEnd len="med" w="med" type="none"/>
-                      <a:tailEnd len="med" w="med" type="none"/>
+                      <a:headEnd len="sm" w="sm" type="none"/>
+                      <a:tailEnd len="sm" w="sm" type="none"/>
                     </a:lnT>
                     <a:lnB cap="flat" cmpd="sng" w="9525">
                       <a:solidFill>
@@ -10323,8 +11652,8 @@
                       </a:solidFill>
                       <a:prstDash val="solid"/>
                       <a:round/>
-                      <a:headEnd len="med" w="med" type="none"/>
-                      <a:tailEnd len="med" w="med" type="none"/>
+                      <a:headEnd len="sm" w="sm" type="none"/>
+                      <a:tailEnd len="sm" w="sm" type="none"/>
                     </a:lnB>
                   </a:tcPr>
                 </a:tc>
@@ -10366,8 +11695,8 @@
                       </a:solidFill>
                       <a:prstDash val="solid"/>
                       <a:round/>
-                      <a:headEnd len="med" w="med" type="none"/>
-                      <a:tailEnd len="med" w="med" type="none"/>
+                      <a:headEnd len="sm" w="sm" type="none"/>
+                      <a:tailEnd len="sm" w="sm" type="none"/>
                     </a:lnL>
                     <a:lnR cap="flat" cmpd="sng" w="9525">
                       <a:solidFill>
@@ -10375,8 +11704,8 @@
                       </a:solidFill>
                       <a:prstDash val="solid"/>
                       <a:round/>
-                      <a:headEnd len="med" w="med" type="none"/>
-                      <a:tailEnd len="med" w="med" type="none"/>
+                      <a:headEnd len="sm" w="sm" type="none"/>
+                      <a:tailEnd len="sm" w="sm" type="none"/>
                     </a:lnR>
                     <a:lnT cap="flat" cmpd="sng" w="9525">
                       <a:solidFill>
@@ -10384,8 +11713,8 @@
                       </a:solidFill>
                       <a:prstDash val="solid"/>
                       <a:round/>
-                      <a:headEnd len="med" w="med" type="none"/>
-                      <a:tailEnd len="med" w="med" type="none"/>
+                      <a:headEnd len="sm" w="sm" type="none"/>
+                      <a:tailEnd len="sm" w="sm" type="none"/>
                     </a:lnT>
                     <a:lnB cap="flat" cmpd="sng" w="9525">
                       <a:solidFill>
@@ -10393,8 +11722,8 @@
                       </a:solidFill>
                       <a:prstDash val="solid"/>
                       <a:round/>
-                      <a:headEnd len="med" w="med" type="none"/>
-                      <a:tailEnd len="med" w="med" type="none"/>
+                      <a:headEnd len="sm" w="sm" type="none"/>
+                      <a:tailEnd len="sm" w="sm" type="none"/>
                     </a:lnB>
                   </a:tcPr>
                 </a:tc>
@@ -10436,8 +11765,8 @@
                       </a:solidFill>
                       <a:prstDash val="solid"/>
                       <a:round/>
-                      <a:headEnd len="med" w="med" type="none"/>
-                      <a:tailEnd len="med" w="med" type="none"/>
+                      <a:headEnd len="sm" w="sm" type="none"/>
+                      <a:tailEnd len="sm" w="sm" type="none"/>
                     </a:lnL>
                     <a:lnR cap="flat" cmpd="sng" w="9525">
                       <a:solidFill>
@@ -10445,8 +11774,8 @@
                       </a:solidFill>
                       <a:prstDash val="solid"/>
                       <a:round/>
-                      <a:headEnd len="med" w="med" type="none"/>
-                      <a:tailEnd len="med" w="med" type="none"/>
+                      <a:headEnd len="sm" w="sm" type="none"/>
+                      <a:tailEnd len="sm" w="sm" type="none"/>
                     </a:lnR>
                     <a:lnT cap="flat" cmpd="sng" w="9525">
                       <a:solidFill>
@@ -10454,8 +11783,8 @@
                       </a:solidFill>
                       <a:prstDash val="solid"/>
                       <a:round/>
-                      <a:headEnd len="med" w="med" type="none"/>
-                      <a:tailEnd len="med" w="med" type="none"/>
+                      <a:headEnd len="sm" w="sm" type="none"/>
+                      <a:tailEnd len="sm" w="sm" type="none"/>
                     </a:lnT>
                     <a:lnB cap="flat" cmpd="sng" w="9525">
                       <a:solidFill>
@@ -10463,8 +11792,8 @@
                       </a:solidFill>
                       <a:prstDash val="solid"/>
                       <a:round/>
-                      <a:headEnd len="med" w="med" type="none"/>
-                      <a:tailEnd len="med" w="med" type="none"/>
+                      <a:headEnd len="sm" w="sm" type="none"/>
+                      <a:tailEnd len="sm" w="sm" type="none"/>
                     </a:lnB>
                   </a:tcPr>
                 </a:tc>
@@ -10506,8 +11835,8 @@
                       </a:solidFill>
                       <a:prstDash val="solid"/>
                       <a:round/>
-                      <a:headEnd len="med" w="med" type="none"/>
-                      <a:tailEnd len="med" w="med" type="none"/>
+                      <a:headEnd len="sm" w="sm" type="none"/>
+                      <a:tailEnd len="sm" w="sm" type="none"/>
                     </a:lnL>
                     <a:lnR cap="flat" cmpd="sng" w="9525">
                       <a:solidFill>
@@ -10515,8 +11844,8 @@
                       </a:solidFill>
                       <a:prstDash val="solid"/>
                       <a:round/>
-                      <a:headEnd len="med" w="med" type="none"/>
-                      <a:tailEnd len="med" w="med" type="none"/>
+                      <a:headEnd len="sm" w="sm" type="none"/>
+                      <a:tailEnd len="sm" w="sm" type="none"/>
                     </a:lnR>
                     <a:lnT cap="flat" cmpd="sng" w="9525">
                       <a:solidFill>
@@ -10524,8 +11853,8 @@
                       </a:solidFill>
                       <a:prstDash val="solid"/>
                       <a:round/>
-                      <a:headEnd len="med" w="med" type="none"/>
-                      <a:tailEnd len="med" w="med" type="none"/>
+                      <a:headEnd len="sm" w="sm" type="none"/>
+                      <a:tailEnd len="sm" w="sm" type="none"/>
                     </a:lnT>
                     <a:lnB cap="flat" cmpd="sng" w="9525">
                       <a:solidFill>
@@ -10533,8 +11862,8 @@
                       </a:solidFill>
                       <a:prstDash val="solid"/>
                       <a:round/>
-                      <a:headEnd len="med" w="med" type="none"/>
-                      <a:tailEnd len="med" w="med" type="none"/>
+                      <a:headEnd len="sm" w="sm" type="none"/>
+                      <a:tailEnd len="sm" w="sm" type="none"/>
                     </a:lnB>
                   </a:tcPr>
                 </a:tc>
@@ -10578,8 +11907,8 @@
                       </a:solidFill>
                       <a:prstDash val="solid"/>
                       <a:round/>
-                      <a:headEnd len="med" w="med" type="none"/>
-                      <a:tailEnd len="med" w="med" type="none"/>
+                      <a:headEnd len="sm" w="sm" type="none"/>
+                      <a:tailEnd len="sm" w="sm" type="none"/>
                     </a:lnL>
                     <a:lnR cap="flat" cmpd="sng" w="9525">
                       <a:solidFill>
@@ -10587,8 +11916,8 @@
                       </a:solidFill>
                       <a:prstDash val="solid"/>
                       <a:round/>
-                      <a:headEnd len="med" w="med" type="none"/>
-                      <a:tailEnd len="med" w="med" type="none"/>
+                      <a:headEnd len="sm" w="sm" type="none"/>
+                      <a:tailEnd len="sm" w="sm" type="none"/>
                     </a:lnR>
                     <a:lnT cap="flat" cmpd="sng" w="9525">
                       <a:solidFill>
@@ -10596,8 +11925,8 @@
                       </a:solidFill>
                       <a:prstDash val="solid"/>
                       <a:round/>
-                      <a:headEnd len="med" w="med" type="none"/>
-                      <a:tailEnd len="med" w="med" type="none"/>
+                      <a:headEnd len="sm" w="sm" type="none"/>
+                      <a:tailEnd len="sm" w="sm" type="none"/>
                     </a:lnT>
                     <a:lnB cap="flat" cmpd="sng" w="9525">
                       <a:solidFill>
@@ -10605,8 +11934,8 @@
                       </a:solidFill>
                       <a:prstDash val="solid"/>
                       <a:round/>
-                      <a:headEnd len="med" w="med" type="none"/>
-                      <a:tailEnd len="med" w="med" type="none"/>
+                      <a:headEnd len="sm" w="sm" type="none"/>
+                      <a:tailEnd len="sm" w="sm" type="none"/>
                     </a:lnB>
                   </a:tcPr>
                 </a:tc>
@@ -10648,8 +11977,8 @@
                       </a:solidFill>
                       <a:prstDash val="solid"/>
                       <a:round/>
-                      <a:headEnd len="med" w="med" type="none"/>
-                      <a:tailEnd len="med" w="med" type="none"/>
+                      <a:headEnd len="sm" w="sm" type="none"/>
+                      <a:tailEnd len="sm" w="sm" type="none"/>
                     </a:lnL>
                     <a:lnR cap="flat" cmpd="sng" w="9525">
                       <a:solidFill>
@@ -10657,8 +11986,8 @@
                       </a:solidFill>
                       <a:prstDash val="solid"/>
                       <a:round/>
-                      <a:headEnd len="med" w="med" type="none"/>
-                      <a:tailEnd len="med" w="med" type="none"/>
+                      <a:headEnd len="sm" w="sm" type="none"/>
+                      <a:tailEnd len="sm" w="sm" type="none"/>
                     </a:lnR>
                     <a:lnT cap="flat" cmpd="sng" w="9525">
                       <a:solidFill>
@@ -10666,8 +11995,8 @@
                       </a:solidFill>
                       <a:prstDash val="solid"/>
                       <a:round/>
-                      <a:headEnd len="med" w="med" type="none"/>
-                      <a:tailEnd len="med" w="med" type="none"/>
+                      <a:headEnd len="sm" w="sm" type="none"/>
+                      <a:tailEnd len="sm" w="sm" type="none"/>
                     </a:lnT>
                     <a:lnB cap="flat" cmpd="sng" w="9525">
                       <a:solidFill>
@@ -10675,8 +12004,8 @@
                       </a:solidFill>
                       <a:prstDash val="solid"/>
                       <a:round/>
-                      <a:headEnd len="med" w="med" type="none"/>
-                      <a:tailEnd len="med" w="med" type="none"/>
+                      <a:headEnd len="sm" w="sm" type="none"/>
+                      <a:tailEnd len="sm" w="sm" type="none"/>
                     </a:lnB>
                   </a:tcPr>
                 </a:tc>
@@ -10718,8 +12047,8 @@
                       </a:solidFill>
                       <a:prstDash val="solid"/>
                       <a:round/>
-                      <a:headEnd len="med" w="med" type="none"/>
-                      <a:tailEnd len="med" w="med" type="none"/>
+                      <a:headEnd len="sm" w="sm" type="none"/>
+                      <a:tailEnd len="sm" w="sm" type="none"/>
                     </a:lnL>
                     <a:lnR cap="flat" cmpd="sng" w="9525">
                       <a:solidFill>
@@ -10727,8 +12056,8 @@
                       </a:solidFill>
                       <a:prstDash val="solid"/>
                       <a:round/>
-                      <a:headEnd len="med" w="med" type="none"/>
-                      <a:tailEnd len="med" w="med" type="none"/>
+                      <a:headEnd len="sm" w="sm" type="none"/>
+                      <a:tailEnd len="sm" w="sm" type="none"/>
                     </a:lnR>
                     <a:lnT cap="flat" cmpd="sng" w="9525">
                       <a:solidFill>
@@ -10736,8 +12065,8 @@
                       </a:solidFill>
                       <a:prstDash val="solid"/>
                       <a:round/>
-                      <a:headEnd len="med" w="med" type="none"/>
-                      <a:tailEnd len="med" w="med" type="none"/>
+                      <a:headEnd len="sm" w="sm" type="none"/>
+                      <a:tailEnd len="sm" w="sm" type="none"/>
                     </a:lnT>
                     <a:lnB cap="flat" cmpd="sng" w="9525">
                       <a:solidFill>
@@ -10745,8 +12074,8 @@
                       </a:solidFill>
                       <a:prstDash val="solid"/>
                       <a:round/>
-                      <a:headEnd len="med" w="med" type="none"/>
-                      <a:tailEnd len="med" w="med" type="none"/>
+                      <a:headEnd len="sm" w="sm" type="none"/>
+                      <a:tailEnd len="sm" w="sm" type="none"/>
                     </a:lnB>
                   </a:tcPr>
                 </a:tc>
@@ -10788,8 +12117,8 @@
                       </a:solidFill>
                       <a:prstDash val="solid"/>
                       <a:round/>
-                      <a:headEnd len="med" w="med" type="none"/>
-                      <a:tailEnd len="med" w="med" type="none"/>
+                      <a:headEnd len="sm" w="sm" type="none"/>
+                      <a:tailEnd len="sm" w="sm" type="none"/>
                     </a:lnL>
                     <a:lnR cap="flat" cmpd="sng" w="9525">
                       <a:solidFill>
@@ -10797,8 +12126,8 @@
                       </a:solidFill>
                       <a:prstDash val="solid"/>
                       <a:round/>
-                      <a:headEnd len="med" w="med" type="none"/>
-                      <a:tailEnd len="med" w="med" type="none"/>
+                      <a:headEnd len="sm" w="sm" type="none"/>
+                      <a:tailEnd len="sm" w="sm" type="none"/>
                     </a:lnR>
                     <a:lnT cap="flat" cmpd="sng" w="9525">
                       <a:solidFill>
@@ -10806,8 +12135,8 @@
                       </a:solidFill>
                       <a:prstDash val="solid"/>
                       <a:round/>
-                      <a:headEnd len="med" w="med" type="none"/>
-                      <a:tailEnd len="med" w="med" type="none"/>
+                      <a:headEnd len="sm" w="sm" type="none"/>
+                      <a:tailEnd len="sm" w="sm" type="none"/>
                     </a:lnT>
                     <a:lnB cap="flat" cmpd="sng" w="9525">
                       <a:solidFill>
@@ -10815,8 +12144,8 @@
                       </a:solidFill>
                       <a:prstDash val="solid"/>
                       <a:round/>
-                      <a:headEnd len="med" w="med" type="none"/>
-                      <a:tailEnd len="med" w="med" type="none"/>
+                      <a:headEnd len="sm" w="sm" type="none"/>
+                      <a:tailEnd len="sm" w="sm" type="none"/>
                     </a:lnB>
                   </a:tcPr>
                 </a:tc>
@@ -10858,8 +12187,8 @@
                       </a:solidFill>
                       <a:prstDash val="solid"/>
                       <a:round/>
-                      <a:headEnd len="med" w="med" type="none"/>
-                      <a:tailEnd len="med" w="med" type="none"/>
+                      <a:headEnd len="sm" w="sm" type="none"/>
+                      <a:tailEnd len="sm" w="sm" type="none"/>
                     </a:lnL>
                     <a:lnR cap="flat" cmpd="sng" w="9525">
                       <a:solidFill>
@@ -10867,8 +12196,8 @@
                       </a:solidFill>
                       <a:prstDash val="solid"/>
                       <a:round/>
-                      <a:headEnd len="med" w="med" type="none"/>
-                      <a:tailEnd len="med" w="med" type="none"/>
+                      <a:headEnd len="sm" w="sm" type="none"/>
+                      <a:tailEnd len="sm" w="sm" type="none"/>
                     </a:lnR>
                     <a:lnT cap="flat" cmpd="sng" w="9525">
                       <a:solidFill>
@@ -10876,8 +12205,8 @@
                       </a:solidFill>
                       <a:prstDash val="solid"/>
                       <a:round/>
-                      <a:headEnd len="med" w="med" type="none"/>
-                      <a:tailEnd len="med" w="med" type="none"/>
+                      <a:headEnd len="sm" w="sm" type="none"/>
+                      <a:tailEnd len="sm" w="sm" type="none"/>
                     </a:lnT>
                     <a:lnB cap="flat" cmpd="sng" w="9525">
                       <a:solidFill>
@@ -10885,8 +12214,8 @@
                       </a:solidFill>
                       <a:prstDash val="solid"/>
                       <a:round/>
-                      <a:headEnd len="med" w="med" type="none"/>
-                      <a:tailEnd len="med" w="med" type="none"/>
+                      <a:headEnd len="sm" w="sm" type="none"/>
+                      <a:tailEnd len="sm" w="sm" type="none"/>
                     </a:lnB>
                   </a:tcPr>
                 </a:tc>
@@ -10928,8 +12257,8 @@
                       </a:solidFill>
                       <a:prstDash val="solid"/>
                       <a:round/>
-                      <a:headEnd len="med" w="med" type="none"/>
-                      <a:tailEnd len="med" w="med" type="none"/>
+                      <a:headEnd len="sm" w="sm" type="none"/>
+                      <a:tailEnd len="sm" w="sm" type="none"/>
                     </a:lnL>
                     <a:lnR cap="flat" cmpd="sng" w="9525">
                       <a:solidFill>
@@ -10937,8 +12266,8 @@
                       </a:solidFill>
                       <a:prstDash val="solid"/>
                       <a:round/>
-                      <a:headEnd len="med" w="med" type="none"/>
-                      <a:tailEnd len="med" w="med" type="none"/>
+                      <a:headEnd len="sm" w="sm" type="none"/>
+                      <a:tailEnd len="sm" w="sm" type="none"/>
                     </a:lnR>
                     <a:lnT cap="flat" cmpd="sng" w="9525">
                       <a:solidFill>
@@ -10946,8 +12275,8 @@
                       </a:solidFill>
                       <a:prstDash val="solid"/>
                       <a:round/>
-                      <a:headEnd len="med" w="med" type="none"/>
-                      <a:tailEnd len="med" w="med" type="none"/>
+                      <a:headEnd len="sm" w="sm" type="none"/>
+                      <a:tailEnd len="sm" w="sm" type="none"/>
                     </a:lnT>
                     <a:lnB cap="flat" cmpd="sng" w="9525">
                       <a:solidFill>
@@ -10955,8 +12284,8 @@
                       </a:solidFill>
                       <a:prstDash val="solid"/>
                       <a:round/>
-                      <a:headEnd len="med" w="med" type="none"/>
-                      <a:tailEnd len="med" w="med" type="none"/>
+                      <a:headEnd len="sm" w="sm" type="none"/>
+                      <a:tailEnd len="sm" w="sm" type="none"/>
                     </a:lnB>
                   </a:tcPr>
                 </a:tc>
@@ -12916,285 +14245,6 @@
 </file>
 
 <file path=ppt/theme/theme1.xml><?xml version="1.0" encoding="utf-8"?>
-<a:theme xmlns:a="http://schemas.openxmlformats.org/drawingml/2006/main" xmlns:r="http://schemas.openxmlformats.org/officeDocument/2006/relationships" name="Custom Theme">
-  <a:themeElements>
-    <a:clrScheme name="Default">
-      <a:dk1>
-        <a:srgbClr val="000000"/>
-      </a:dk1>
-      <a:lt1>
-        <a:srgbClr val="FFFFFF"/>
-      </a:lt1>
-      <a:dk2>
-        <a:srgbClr val="158158"/>
-      </a:dk2>
-      <a:lt2>
-        <a:srgbClr val="F3F3F3"/>
-      </a:lt2>
-      <a:accent1>
-        <a:srgbClr val="058DC7"/>
-      </a:accent1>
-      <a:accent2>
-        <a:srgbClr val="50B432"/>
-      </a:accent2>
-      <a:accent3>
-        <a:srgbClr val="ED561B"/>
-      </a:accent3>
-      <a:accent4>
-        <a:srgbClr val="EDEF00"/>
-      </a:accent4>
-      <a:accent5>
-        <a:srgbClr val="24CBE5"/>
-      </a:accent5>
-      <a:accent6>
-        <a:srgbClr val="64E572"/>
-      </a:accent6>
-      <a:hlink>
-        <a:srgbClr val="2200CC"/>
-      </a:hlink>
-      <a:folHlink>
-        <a:srgbClr val="551A8B"/>
-      </a:folHlink>
-    </a:clrScheme>
-    <a:fontScheme name="Office">
-      <a:majorFont>
-        <a:latin typeface="Arial"/>
-        <a:ea typeface=""/>
-        <a:cs typeface=""/>
-        <a:font script="Jpan" typeface="ＭＳ Ｐゴシック"/>
-        <a:font script="Hang" typeface="맑은 고딕"/>
-        <a:font script="Hans" typeface="宋体"/>
-        <a:font script="Hant" typeface="新細明體"/>
-        <a:font script="Arab" typeface="Times New Roman"/>
-        <a:font script="Hebr" typeface="Times New Roman"/>
-        <a:font script="Thai" typeface="Angsana New"/>
-        <a:font script="Ethi" typeface="Nyala"/>
-        <a:font script="Beng" typeface="Vrinda"/>
-        <a:font script="Gujr" typeface="Shruti"/>
-        <a:font script="Khmr" typeface="MoolBoran"/>
-        <a:font script="Knda" typeface="Tunga"/>
-        <a:font script="Guru" typeface="Raavi"/>
-        <a:font script="Cans" typeface="Euphemia"/>
-        <a:font script="Cher" typeface="Plantagenet Cherokee"/>
-        <a:font script="Yiii" typeface="Microsoft Yi Baiti"/>
-        <a:font script="Tibt" typeface="Microsoft Himalaya"/>
-        <a:font script="Thaa" typeface="MV Boli"/>
-        <a:font script="Deva" typeface="Mangal"/>
-        <a:font script="Telu" typeface="Gautami"/>
-        <a:font script="Taml" typeface="Latha"/>
-        <a:font script="Syrc" typeface="Estrangelo Edessa"/>
-        <a:font script="Orya" typeface="Kalinga"/>
-        <a:font script="Mlym" typeface="Kartika"/>
-        <a:font script="Laoo" typeface="DokChampa"/>
-        <a:font script="Sinh" typeface="Iskoola Pota"/>
-        <a:font script="Mong" typeface="Mongolian Baiti"/>
-        <a:font script="Viet" typeface="Times New Roman"/>
-        <a:font script="Uigh" typeface="Microsoft Uighur"/>
-        <a:font script="Geor" typeface="Sylfaen"/>
-      </a:majorFont>
-      <a:minorFont>
-        <a:latin typeface="Arial"/>
-        <a:ea typeface=""/>
-        <a:cs typeface=""/>
-        <a:font script="Jpan" typeface="ＭＳ Ｐゴシック"/>
-        <a:font script="Hang" typeface="맑은 고딕"/>
-        <a:font script="Hans" typeface="宋体"/>
-        <a:font script="Hant" typeface="新細明體"/>
-        <a:font script="Arab" typeface="Arial"/>
-        <a:font script="Hebr" typeface="Arial"/>
-        <a:font script="Thai" typeface="Cordia New"/>
-        <a:font script="Ethi" typeface="Nyala"/>
-        <a:font script="Beng" typeface="Vrinda"/>
-        <a:font script="Gujr" typeface="Shruti"/>
-        <a:font script="Khmr" typeface="DaunPenh"/>
-        <a:font script="Knda" typeface="Tunga"/>
-        <a:font script="Guru" typeface="Raavi"/>
-        <a:font script="Cans" typeface="Euphemia"/>
-        <a:font script="Cher" typeface="Plantagenet Cherokee"/>
-        <a:font script="Yiii" typeface="Microsoft Yi Baiti"/>
-        <a:font script="Tibt" typeface="Microsoft Himalaya"/>
-        <a:font script="Thaa" typeface="MV Boli"/>
-        <a:font script="Deva" typeface="Mangal"/>
-        <a:font script="Telu" typeface="Gautami"/>
-        <a:font script="Taml" typeface="Latha"/>
-        <a:font script="Syrc" typeface="Estrangelo Edessa"/>
-        <a:font script="Orya" typeface="Kalinga"/>
-        <a:font script="Mlym" typeface="Kartika"/>
-        <a:font script="Laoo" typeface="DokChampa"/>
-        <a:font script="Sinh" typeface="Iskoola Pota"/>
-        <a:font script="Mong" typeface="Mongolian Baiti"/>
-        <a:font script="Viet" typeface="Arial"/>
-        <a:font script="Uigh" typeface="Microsoft Uighur"/>
-        <a:font script="Geor" typeface="Sylfaen"/>
-      </a:minorFont>
-    </a:fontScheme>
-    <a:fmtScheme name="Office">
-      <a:fillStyleLst>
-        <a:solidFill>
-          <a:schemeClr val="phClr"/>
-        </a:solidFill>
-        <a:gradFill rotWithShape="1">
-          <a:gsLst>
-            <a:gs pos="0">
-              <a:schemeClr val="phClr">
-                <a:tint val="50000"/>
-                <a:satMod val="300000"/>
-              </a:schemeClr>
-            </a:gs>
-            <a:gs pos="35000">
-              <a:schemeClr val="phClr">
-                <a:tint val="37000"/>
-                <a:satMod val="300000"/>
-              </a:schemeClr>
-            </a:gs>
-            <a:gs pos="100000">
-              <a:schemeClr val="phClr">
-                <a:tint val="15000"/>
-                <a:satMod val="350000"/>
-              </a:schemeClr>
-            </a:gs>
-          </a:gsLst>
-          <a:lin ang="16200000" scaled="1"/>
-        </a:gradFill>
-        <a:gradFill rotWithShape="1">
-          <a:gsLst>
-            <a:gs pos="0">
-              <a:schemeClr val="phClr">
-                <a:tint val="100000"/>
-                <a:shade val="100000"/>
-                <a:satMod val="130000"/>
-              </a:schemeClr>
-            </a:gs>
-            <a:gs pos="100000">
-              <a:schemeClr val="phClr">
-                <a:tint val="50000"/>
-                <a:shade val="100000"/>
-                <a:satMod val="350000"/>
-              </a:schemeClr>
-            </a:gs>
-          </a:gsLst>
-          <a:lin ang="16200000" scaled="0"/>
-        </a:gradFill>
-      </a:fillStyleLst>
-      <a:lnStyleLst>
-        <a:ln w="9525" cap="flat" cmpd="sng" algn="ctr">
-          <a:solidFill>
-            <a:schemeClr val="phClr">
-              <a:shade val="95000"/>
-              <a:satMod val="105000"/>
-            </a:schemeClr>
-          </a:solidFill>
-          <a:prstDash val="solid"/>
-        </a:ln>
-        <a:ln w="25400" cap="flat" cmpd="sng" algn="ctr">
-          <a:solidFill>
-            <a:schemeClr val="phClr"/>
-          </a:solidFill>
-          <a:prstDash val="solid"/>
-        </a:ln>
-        <a:ln w="38100" cap="flat" cmpd="sng" algn="ctr">
-          <a:solidFill>
-            <a:schemeClr val="phClr"/>
-          </a:solidFill>
-          <a:prstDash val="solid"/>
-        </a:ln>
-      </a:lnStyleLst>
-      <a:effectStyleLst>
-        <a:effectStyle>
-          <a:effectLst>
-            <a:outerShdw blurRad="40000" dist="20000" dir="5400000" rotWithShape="0">
-              <a:srgbClr val="000000">
-                <a:alpha val="38000"/>
-              </a:srgbClr>
-            </a:outerShdw>
-          </a:effectLst>
-        </a:effectStyle>
-        <a:effectStyle>
-          <a:effectLst>
-            <a:outerShdw blurRad="40000" dist="23000" dir="5400000" rotWithShape="0">
-              <a:srgbClr val="000000">
-                <a:alpha val="35000"/>
-              </a:srgbClr>
-            </a:outerShdw>
-          </a:effectLst>
-        </a:effectStyle>
-        <a:effectStyle>
-          <a:effectLst>
-            <a:outerShdw blurRad="40000" dist="23000" dir="5400000" rotWithShape="0">
-              <a:srgbClr val="000000">
-                <a:alpha val="35000"/>
-              </a:srgbClr>
-            </a:outerShdw>
-          </a:effectLst>
-          <a:scene3d>
-            <a:camera prst="orthographicFront">
-              <a:rot lat="0" lon="0" rev="0"/>
-            </a:camera>
-            <a:lightRig rig="threePt" dir="t">
-              <a:rot lat="0" lon="0" rev="1200000"/>
-            </a:lightRig>
-          </a:scene3d>
-          <a:sp3d>
-            <a:bevelT w="63500" h="25400"/>
-          </a:sp3d>
-        </a:effectStyle>
-      </a:effectStyleLst>
-      <a:bgFillStyleLst>
-        <a:solidFill>
-          <a:schemeClr val="phClr"/>
-        </a:solidFill>
-        <a:gradFill rotWithShape="1">
-          <a:gsLst>
-            <a:gs pos="0">
-              <a:schemeClr val="phClr">
-                <a:tint val="40000"/>
-                <a:satMod val="350000"/>
-              </a:schemeClr>
-            </a:gs>
-            <a:gs pos="40000">
-              <a:schemeClr val="phClr">
-                <a:tint val="45000"/>
-                <a:shade val="99000"/>
-                <a:satMod val="350000"/>
-              </a:schemeClr>
-            </a:gs>
-            <a:gs pos="100000">
-              <a:schemeClr val="phClr">
-                <a:shade val="20000"/>
-                <a:satMod val="255000"/>
-              </a:schemeClr>
-            </a:gs>
-          </a:gsLst>
-          <a:path path="circle">
-            <a:fillToRect l="50000" t="-80000" r="50000" b="180000"/>
-          </a:path>
-        </a:gradFill>
-        <a:gradFill rotWithShape="1">
-          <a:gsLst>
-            <a:gs pos="0">
-              <a:schemeClr val="phClr">
-                <a:tint val="80000"/>
-                <a:satMod val="300000"/>
-              </a:schemeClr>
-            </a:gs>
-            <a:gs pos="100000">
-              <a:schemeClr val="phClr">
-                <a:shade val="30000"/>
-                <a:satMod val="200000"/>
-              </a:schemeClr>
-            </a:gs>
-          </a:gsLst>
-          <a:path path="circle">
-            <a:fillToRect l="50000" t="50000" r="50000" b="50000"/>
-          </a:path>
-        </a:gradFill>
-      </a:bgFillStyleLst>
-    </a:fmtScheme>
-  </a:themeElements>
-</a:theme>
-</file>
-
-<file path=ppt/theme/theme2.xml><?xml version="1.0" encoding="utf-8"?>
 <a:theme xmlns:a="http://schemas.openxmlformats.org/drawingml/2006/main" xmlns:r="http://schemas.openxmlformats.org/officeDocument/2006/relationships" name="Focus">
   <a:themeElements>
     <a:clrScheme name="Focus">
@@ -13471,4 +14521,283 @@
     </a:fmtScheme>
   </a:themeElements>
 </a:theme>
+</file>
+
+<file path=ppt/theme/theme2.xml><?xml version="1.0" encoding="utf-8"?>
+<a:theme xmlns:a="http://schemas.openxmlformats.org/drawingml/2006/main" xmlns:r="http://schemas.openxmlformats.org/officeDocument/2006/relationships">
+  <a:themeElements>
+    <a:clrScheme name="Default">
+      <a:dk1>
+        <a:srgbClr val="000000"/>
+      </a:dk1>
+      <a:lt1>
+        <a:srgbClr val="FFFFFF"/>
+      </a:lt1>
+      <a:dk2>
+        <a:srgbClr val="158158"/>
+      </a:dk2>
+      <a:lt2>
+        <a:srgbClr val="F3F3F3"/>
+      </a:lt2>
+      <a:accent1>
+        <a:srgbClr val="058DC7"/>
+      </a:accent1>
+      <a:accent2>
+        <a:srgbClr val="50B432"/>
+      </a:accent2>
+      <a:accent3>
+        <a:srgbClr val="ED561B"/>
+      </a:accent3>
+      <a:accent4>
+        <a:srgbClr val="EDEF00"/>
+      </a:accent4>
+      <a:accent5>
+        <a:srgbClr val="24CBE5"/>
+      </a:accent5>
+      <a:accent6>
+        <a:srgbClr val="64E572"/>
+      </a:accent6>
+      <a:hlink>
+        <a:srgbClr val="2200CC"/>
+      </a:hlink>
+      <a:folHlink>
+        <a:srgbClr val="551A8B"/>
+      </a:folHlink>
+    </a:clrScheme>
+    <a:fontScheme name="Office">
+      <a:majorFont>
+        <a:latin typeface="Arial"/>
+        <a:ea typeface=""/>
+        <a:cs typeface=""/>
+        <a:font script="Jpan" typeface="ＭＳ Ｐゴシック"/>
+        <a:font script="Hang" typeface="맑은 고딕"/>
+        <a:font script="Hans" typeface="宋体"/>
+        <a:font script="Hant" typeface="新細明體"/>
+        <a:font script="Arab" typeface="Times New Roman"/>
+        <a:font script="Hebr" typeface="Times New Roman"/>
+        <a:font script="Thai" typeface="Angsana New"/>
+        <a:font script="Ethi" typeface="Nyala"/>
+        <a:font script="Beng" typeface="Vrinda"/>
+        <a:font script="Gujr" typeface="Shruti"/>
+        <a:font script="Khmr" typeface="MoolBoran"/>
+        <a:font script="Knda" typeface="Tunga"/>
+        <a:font script="Guru" typeface="Raavi"/>
+        <a:font script="Cans" typeface="Euphemia"/>
+        <a:font script="Cher" typeface="Plantagenet Cherokee"/>
+        <a:font script="Yiii" typeface="Microsoft Yi Baiti"/>
+        <a:font script="Tibt" typeface="Microsoft Himalaya"/>
+        <a:font script="Thaa" typeface="MV Boli"/>
+        <a:font script="Deva" typeface="Mangal"/>
+        <a:font script="Telu" typeface="Gautami"/>
+        <a:font script="Taml" typeface="Latha"/>
+        <a:font script="Syrc" typeface="Estrangelo Edessa"/>
+        <a:font script="Orya" typeface="Kalinga"/>
+        <a:font script="Mlym" typeface="Kartika"/>
+        <a:font script="Laoo" typeface="DokChampa"/>
+        <a:font script="Sinh" typeface="Iskoola Pota"/>
+        <a:font script="Mong" typeface="Mongolian Baiti"/>
+        <a:font script="Viet" typeface="Times New Roman"/>
+        <a:font script="Uigh" typeface="Microsoft Uighur"/>
+        <a:font script="Geor" typeface="Sylfaen"/>
+      </a:majorFont>
+      <a:minorFont>
+        <a:latin typeface="Arial"/>
+        <a:ea typeface=""/>
+        <a:cs typeface=""/>
+        <a:font script="Jpan" typeface="ＭＳ Ｐゴシック"/>
+        <a:font script="Hang" typeface="맑은 고딕"/>
+        <a:font script="Hans" typeface="宋体"/>
+        <a:font script="Hant" typeface="新細明體"/>
+        <a:font script="Arab" typeface="Arial"/>
+        <a:font script="Hebr" typeface="Arial"/>
+        <a:font script="Thai" typeface="Cordia New"/>
+        <a:font script="Ethi" typeface="Nyala"/>
+        <a:font script="Beng" typeface="Vrinda"/>
+        <a:font script="Gujr" typeface="Shruti"/>
+        <a:font script="Khmr" typeface="DaunPenh"/>
+        <a:font script="Knda" typeface="Tunga"/>
+        <a:font script="Guru" typeface="Raavi"/>
+        <a:font script="Cans" typeface="Euphemia"/>
+        <a:font script="Cher" typeface="Plantagenet Cherokee"/>
+        <a:font script="Yiii" typeface="Microsoft Yi Baiti"/>
+        <a:font script="Tibt" typeface="Microsoft Himalaya"/>
+        <a:font script="Thaa" typeface="MV Boli"/>
+        <a:font script="Deva" typeface="Mangal"/>
+        <a:font script="Telu" typeface="Gautami"/>
+        <a:font script="Taml" typeface="Latha"/>
+        <a:font script="Syrc" typeface="Estrangelo Edessa"/>
+        <a:font script="Orya" typeface="Kalinga"/>
+        <a:font script="Mlym" typeface="Kartika"/>
+        <a:font script="Laoo" typeface="DokChampa"/>
+        <a:font script="Sinh" typeface="Iskoola Pota"/>
+        <a:font script="Mong" typeface="Mongolian Baiti"/>
+        <a:font script="Viet" typeface="Arial"/>
+        <a:font script="Uigh" typeface="Microsoft Uighur"/>
+        <a:font script="Geor" typeface="Sylfaen"/>
+      </a:minorFont>
+    </a:fontScheme>
+    <a:fmtScheme name="Office">
+      <a:fillStyleLst>
+        <a:solidFill>
+          <a:schemeClr val="phClr"/>
+        </a:solidFill>
+        <a:gradFill rotWithShape="1">
+          <a:gsLst>
+            <a:gs pos="0">
+              <a:schemeClr val="phClr">
+                <a:tint val="50000"/>
+                <a:satMod val="300000"/>
+              </a:schemeClr>
+            </a:gs>
+            <a:gs pos="35000">
+              <a:schemeClr val="phClr">
+                <a:tint val="37000"/>
+                <a:satMod val="300000"/>
+              </a:schemeClr>
+            </a:gs>
+            <a:gs pos="100000">
+              <a:schemeClr val="phClr">
+                <a:tint val="15000"/>
+                <a:satMod val="350000"/>
+              </a:schemeClr>
+            </a:gs>
+          </a:gsLst>
+          <a:lin ang="16200000" scaled="1"/>
+        </a:gradFill>
+        <a:gradFill rotWithShape="1">
+          <a:gsLst>
+            <a:gs pos="0">
+              <a:schemeClr val="phClr">
+                <a:tint val="100000"/>
+                <a:shade val="100000"/>
+                <a:satMod val="130000"/>
+              </a:schemeClr>
+            </a:gs>
+            <a:gs pos="100000">
+              <a:schemeClr val="phClr">
+                <a:tint val="50000"/>
+                <a:shade val="100000"/>
+                <a:satMod val="350000"/>
+              </a:schemeClr>
+            </a:gs>
+          </a:gsLst>
+          <a:lin ang="16200000" scaled="0"/>
+        </a:gradFill>
+      </a:fillStyleLst>
+      <a:lnStyleLst>
+        <a:ln w="9525" cap="flat" cmpd="sng" algn="ctr">
+          <a:solidFill>
+            <a:schemeClr val="phClr">
+              <a:shade val="95000"/>
+              <a:satMod val="105000"/>
+            </a:schemeClr>
+          </a:solidFill>
+          <a:prstDash val="solid"/>
+        </a:ln>
+        <a:ln w="25400" cap="flat" cmpd="sng" algn="ctr">
+          <a:solidFill>
+            <a:schemeClr val="phClr"/>
+          </a:solidFill>
+          <a:prstDash val="solid"/>
+        </a:ln>
+        <a:ln w="38100" cap="flat" cmpd="sng" algn="ctr">
+          <a:solidFill>
+            <a:schemeClr val="phClr"/>
+          </a:solidFill>
+          <a:prstDash val="solid"/>
+        </a:ln>
+      </a:lnStyleLst>
+      <a:effectStyleLst>
+        <a:effectStyle>
+          <a:effectLst>
+            <a:outerShdw blurRad="40000" dist="20000" dir="5400000" rotWithShape="0">
+              <a:srgbClr val="000000">
+                <a:alpha val="38000"/>
+              </a:srgbClr>
+            </a:outerShdw>
+          </a:effectLst>
+        </a:effectStyle>
+        <a:effectStyle>
+          <a:effectLst>
+            <a:outerShdw blurRad="40000" dist="23000" dir="5400000" rotWithShape="0">
+              <a:srgbClr val="000000">
+                <a:alpha val="35000"/>
+              </a:srgbClr>
+            </a:outerShdw>
+          </a:effectLst>
+        </a:effectStyle>
+        <a:effectStyle>
+          <a:effectLst>
+            <a:outerShdw blurRad="40000" dist="23000" dir="5400000" rotWithShape="0">
+              <a:srgbClr val="000000">
+                <a:alpha val="35000"/>
+              </a:srgbClr>
+            </a:outerShdw>
+          </a:effectLst>
+          <a:scene3d>
+            <a:camera prst="orthographicFront">
+              <a:rot lat="0" lon="0" rev="0"/>
+            </a:camera>
+            <a:lightRig rig="threePt" dir="t">
+              <a:rot lat="0" lon="0" rev="1200000"/>
+            </a:lightRig>
+          </a:scene3d>
+          <a:sp3d>
+            <a:bevelT w="63500" h="25400"/>
+          </a:sp3d>
+        </a:effectStyle>
+      </a:effectStyleLst>
+      <a:bgFillStyleLst>
+        <a:solidFill>
+          <a:schemeClr val="phClr"/>
+        </a:solidFill>
+        <a:gradFill rotWithShape="1">
+          <a:gsLst>
+            <a:gs pos="0">
+              <a:schemeClr val="phClr">
+                <a:tint val="40000"/>
+                <a:satMod val="350000"/>
+              </a:schemeClr>
+            </a:gs>
+            <a:gs pos="40000">
+              <a:schemeClr val="phClr">
+                <a:tint val="45000"/>
+                <a:shade val="99000"/>
+                <a:satMod val="350000"/>
+              </a:schemeClr>
+            </a:gs>
+            <a:gs pos="100000">
+              <a:schemeClr val="phClr">
+                <a:shade val="20000"/>
+                <a:satMod val="255000"/>
+              </a:schemeClr>
+            </a:gs>
+          </a:gsLst>
+          <a:path path="circle">
+            <a:fillToRect l="50000" t="-80000" r="50000" b="180000"/>
+          </a:path>
+        </a:gradFill>
+        <a:gradFill rotWithShape="1">
+          <a:gsLst>
+            <a:gs pos="0">
+              <a:schemeClr val="phClr">
+                <a:tint val="80000"/>
+                <a:satMod val="300000"/>
+              </a:schemeClr>
+            </a:gs>
+            <a:gs pos="100000">
+              <a:schemeClr val="phClr">
+                <a:shade val="30000"/>
+                <a:satMod val="200000"/>
+              </a:schemeClr>
+            </a:gs>
+          </a:gsLst>
+          <a:path path="circle">
+            <a:fillToRect l="50000" t="50000" r="50000" b="50000"/>
+          </a:path>
+        </a:gradFill>
+      </a:bgFillStyleLst>
+    </a:fmtScheme>
+  </a:themeElements>
+</a:theme>
 </file>
</xml_diff>